<commit_message>
changes in script and powerpoint
</commit_message>
<xml_diff>
--- a/Presentation/Presentation nov 18.pptx
+++ b/Presentation/Presentation nov 18.pptx
@@ -196,7 +196,7 @@
           <a:p>
             <a:fld id="{9184657C-6B7B-4D11-92FE-19D7F27F78B9}" type="datetimeFigureOut">
               <a:rPr lang="en-GB" smtClean="0"/>
-              <a:t>17/11/2014</a:t>
+              <a:t>17.11.14</a:t>
             </a:fld>
             <a:endParaRPr lang="en-GB"/>
           </a:p>
@@ -357,13 +357,18 @@
           <a:p>
             <a:fld id="{1E047F9F-E4D1-4A29-BB8A-19035468A4E4}" type="slidenum">
               <a:rPr lang="en-GB" smtClean="0"/>
-              <a:t>‹Nº›</a:t>
+              <a:t>‹#›</a:t>
             </a:fld>
             <a:endParaRPr lang="en-GB"/>
           </a:p>
         </p:txBody>
       </p:sp>
     </p:spTree>
+    <p:extLst>
+      <p:ext uri="{BB962C8B-B14F-4D97-AF65-F5344CB8AC3E}">
+        <p14:creationId xmlns:p14="http://schemas.microsoft.com/office/powerpoint/2010/main" val="2624709471"/>
+      </p:ext>
+    </p:extLst>
   </p:cSld>
   <p:clrMap bg1="lt1" tx1="dk1" bg2="lt2" tx2="dk2" accent1="accent1" accent2="accent2" accent3="accent3" accent4="accent4" accent5="accent5" accent6="accent6" hlink="hlink" folHlink="folHlink"/>
   <p:notesStyle>
@@ -724,7 +729,7 @@
             <a:fld id="{89ABF61E-C81E-B147-A9C3-9359CCDF05AF}" type="datetimeFigureOut">
               <a:rPr lang="nb-NO" smtClean="0"/>
               <a:pPr/>
-              <a:t>17.11.2014</a:t>
+              <a:t>17.11.14</a:t>
             </a:fld>
             <a:endParaRPr lang="nb-NO"/>
           </a:p>
@@ -767,7 +772,7 @@
             <a:fld id="{A592D690-0A75-2B47-B762-A5B99D01306A}" type="slidenum">
               <a:rPr lang="nb-NO" smtClean="0"/>
               <a:pPr/>
-              <a:t>‹Nº›</a:t>
+              <a:t>‹#›</a:t>
             </a:fld>
             <a:endParaRPr lang="nb-NO"/>
           </a:p>
@@ -891,7 +896,7 @@
             <a:fld id="{89ABF61E-C81E-B147-A9C3-9359CCDF05AF}" type="datetimeFigureOut">
               <a:rPr lang="nb-NO" smtClean="0"/>
               <a:pPr/>
-              <a:t>17.11.2014</a:t>
+              <a:t>17.11.14</a:t>
             </a:fld>
             <a:endParaRPr lang="nb-NO"/>
           </a:p>
@@ -934,7 +939,7 @@
             <a:fld id="{A592D690-0A75-2B47-B762-A5B99D01306A}" type="slidenum">
               <a:rPr lang="nb-NO" smtClean="0"/>
               <a:pPr/>
-              <a:t>‹Nº›</a:t>
+              <a:t>‹#›</a:t>
             </a:fld>
             <a:endParaRPr lang="nb-NO"/>
           </a:p>
@@ -1068,7 +1073,7 @@
             <a:fld id="{89ABF61E-C81E-B147-A9C3-9359CCDF05AF}" type="datetimeFigureOut">
               <a:rPr lang="nb-NO" smtClean="0"/>
               <a:pPr/>
-              <a:t>17.11.2014</a:t>
+              <a:t>17.11.14</a:t>
             </a:fld>
             <a:endParaRPr lang="nb-NO"/>
           </a:p>
@@ -1111,7 +1116,7 @@
             <a:fld id="{A592D690-0A75-2B47-B762-A5B99D01306A}" type="slidenum">
               <a:rPr lang="nb-NO" smtClean="0"/>
               <a:pPr/>
-              <a:t>‹Nº›</a:t>
+              <a:t>‹#›</a:t>
             </a:fld>
             <a:endParaRPr lang="nb-NO"/>
           </a:p>
@@ -1235,7 +1240,7 @@
             <a:fld id="{89ABF61E-C81E-B147-A9C3-9359CCDF05AF}" type="datetimeFigureOut">
               <a:rPr lang="nb-NO" smtClean="0"/>
               <a:pPr/>
-              <a:t>17.11.2014</a:t>
+              <a:t>17.11.14</a:t>
             </a:fld>
             <a:endParaRPr lang="nb-NO"/>
           </a:p>
@@ -1278,7 +1283,7 @@
             <a:fld id="{A592D690-0A75-2B47-B762-A5B99D01306A}" type="slidenum">
               <a:rPr lang="nb-NO" smtClean="0"/>
               <a:pPr/>
-              <a:t>‹Nº›</a:t>
+              <a:t>‹#›</a:t>
             </a:fld>
             <a:endParaRPr lang="nb-NO"/>
           </a:p>
@@ -1478,7 +1483,7 @@
             <a:fld id="{89ABF61E-C81E-B147-A9C3-9359CCDF05AF}" type="datetimeFigureOut">
               <a:rPr lang="nb-NO" smtClean="0"/>
               <a:pPr/>
-              <a:t>17.11.2014</a:t>
+              <a:t>17.11.14</a:t>
             </a:fld>
             <a:endParaRPr lang="nb-NO"/>
           </a:p>
@@ -1521,7 +1526,7 @@
             <a:fld id="{A592D690-0A75-2B47-B762-A5B99D01306A}" type="slidenum">
               <a:rPr lang="nb-NO" smtClean="0"/>
               <a:pPr/>
-              <a:t>‹Nº›</a:t>
+              <a:t>‹#›</a:t>
             </a:fld>
             <a:endParaRPr lang="nb-NO"/>
           </a:p>
@@ -1763,7 +1768,7 @@
             <a:fld id="{89ABF61E-C81E-B147-A9C3-9359CCDF05AF}" type="datetimeFigureOut">
               <a:rPr lang="nb-NO" smtClean="0"/>
               <a:pPr/>
-              <a:t>17.11.2014</a:t>
+              <a:t>17.11.14</a:t>
             </a:fld>
             <a:endParaRPr lang="nb-NO"/>
           </a:p>
@@ -1806,7 +1811,7 @@
             <a:fld id="{A592D690-0A75-2B47-B762-A5B99D01306A}" type="slidenum">
               <a:rPr lang="nb-NO" smtClean="0"/>
               <a:pPr/>
-              <a:t>‹Nº›</a:t>
+              <a:t>‹#›</a:t>
             </a:fld>
             <a:endParaRPr lang="nb-NO"/>
           </a:p>
@@ -2182,7 +2187,7 @@
             <a:fld id="{89ABF61E-C81E-B147-A9C3-9359CCDF05AF}" type="datetimeFigureOut">
               <a:rPr lang="nb-NO" smtClean="0"/>
               <a:pPr/>
-              <a:t>17.11.2014</a:t>
+              <a:t>17.11.14</a:t>
             </a:fld>
             <a:endParaRPr lang="nb-NO"/>
           </a:p>
@@ -2225,7 +2230,7 @@
             <a:fld id="{A592D690-0A75-2B47-B762-A5B99D01306A}" type="slidenum">
               <a:rPr lang="nb-NO" smtClean="0"/>
               <a:pPr/>
-              <a:t>‹Nº›</a:t>
+              <a:t>‹#›</a:t>
             </a:fld>
             <a:endParaRPr lang="nb-NO"/>
           </a:p>
@@ -2297,7 +2302,7 @@
             <a:fld id="{89ABF61E-C81E-B147-A9C3-9359CCDF05AF}" type="datetimeFigureOut">
               <a:rPr lang="nb-NO" smtClean="0"/>
               <a:pPr/>
-              <a:t>17.11.2014</a:t>
+              <a:t>17.11.14</a:t>
             </a:fld>
             <a:endParaRPr lang="nb-NO"/>
           </a:p>
@@ -2340,7 +2345,7 @@
             <a:fld id="{A592D690-0A75-2B47-B762-A5B99D01306A}" type="slidenum">
               <a:rPr lang="nb-NO" smtClean="0"/>
               <a:pPr/>
-              <a:t>‹Nº›</a:t>
+              <a:t>‹#›</a:t>
             </a:fld>
             <a:endParaRPr lang="nb-NO"/>
           </a:p>
@@ -2389,7 +2394,7 @@
             <a:fld id="{89ABF61E-C81E-B147-A9C3-9359CCDF05AF}" type="datetimeFigureOut">
               <a:rPr lang="nb-NO" smtClean="0"/>
               <a:pPr/>
-              <a:t>17.11.2014</a:t>
+              <a:t>17.11.14</a:t>
             </a:fld>
             <a:endParaRPr lang="nb-NO"/>
           </a:p>
@@ -2432,7 +2437,7 @@
             <a:fld id="{A592D690-0A75-2B47-B762-A5B99D01306A}" type="slidenum">
               <a:rPr lang="nb-NO" smtClean="0"/>
               <a:pPr/>
-              <a:t>‹Nº›</a:t>
+              <a:t>‹#›</a:t>
             </a:fld>
             <a:endParaRPr lang="nb-NO"/>
           </a:p>
@@ -2663,7 +2668,7 @@
             <a:fld id="{89ABF61E-C81E-B147-A9C3-9359CCDF05AF}" type="datetimeFigureOut">
               <a:rPr lang="nb-NO" smtClean="0"/>
               <a:pPr/>
-              <a:t>17.11.2014</a:t>
+              <a:t>17.11.14</a:t>
             </a:fld>
             <a:endParaRPr lang="nb-NO"/>
           </a:p>
@@ -2706,7 +2711,7 @@
             <a:fld id="{A592D690-0A75-2B47-B762-A5B99D01306A}" type="slidenum">
               <a:rPr lang="nb-NO" smtClean="0"/>
               <a:pPr/>
-              <a:t>‹Nº›</a:t>
+              <a:t>‹#›</a:t>
             </a:fld>
             <a:endParaRPr lang="nb-NO"/>
           </a:p>
@@ -2913,7 +2918,7 @@
             <a:fld id="{89ABF61E-C81E-B147-A9C3-9359CCDF05AF}" type="datetimeFigureOut">
               <a:rPr lang="nb-NO" smtClean="0"/>
               <a:pPr/>
-              <a:t>17.11.2014</a:t>
+              <a:t>17.11.14</a:t>
             </a:fld>
             <a:endParaRPr lang="nb-NO"/>
           </a:p>
@@ -2956,7 +2961,7 @@
             <a:fld id="{A592D690-0A75-2B47-B762-A5B99D01306A}" type="slidenum">
               <a:rPr lang="nb-NO" smtClean="0"/>
               <a:pPr/>
-              <a:t>‹Nº›</a:t>
+              <a:t>‹#›</a:t>
             </a:fld>
             <a:endParaRPr lang="nb-NO"/>
           </a:p>
@@ -3123,7 +3128,7 @@
             <a:fld id="{89ABF61E-C81E-B147-A9C3-9359CCDF05AF}" type="datetimeFigureOut">
               <a:rPr lang="nb-NO" smtClean="0"/>
               <a:pPr/>
-              <a:t>17.11.2014</a:t>
+              <a:t>17.11.14</a:t>
             </a:fld>
             <a:endParaRPr lang="nb-NO"/>
           </a:p>
@@ -3202,7 +3207,7 @@
             <a:fld id="{A592D690-0A75-2B47-B762-A5B99D01306A}" type="slidenum">
               <a:rPr lang="nb-NO" smtClean="0"/>
               <a:pPr/>
-              <a:t>‹Nº›</a:t>
+              <a:t>‹#›</a:t>
             </a:fld>
             <a:endParaRPr lang="nb-NO"/>
           </a:p>
@@ -3640,6 +3645,13 @@
   <p:clrMapOvr>
     <a:masterClrMapping/>
   </p:clrMapOvr>
+  <p:timing>
+    <p:tnLst>
+      <p:par>
+        <p:cTn xmlns:p14="http://schemas.microsoft.com/office/powerpoint/2010/main" id="1" dur="indefinite" restart="never" nodeType="tmRoot"/>
+      </p:par>
+    </p:tnLst>
+  </p:timing>
 </p:sld>
 </file>
 
@@ -3677,11 +3689,7 @@
           <a:p>
             <a:r>
               <a:rPr lang="nb-NO" dirty="0" smtClean="0"/>
-              <a:t>M</a:t>
-            </a:r>
-            <a:r>
-              <a:rPr lang="nb-NO" dirty="0" smtClean="0"/>
-              <a:t>eta-Analysis</a:t>
+              <a:t>Meta-Analysis</a:t>
             </a:r>
             <a:endParaRPr lang="nb-NO" dirty="0"/>
           </a:p>
@@ -3932,13 +3940,368 @@
     </p:spTree>
     <p:extLst>
       <p:ext uri="{BB962C8B-B14F-4D97-AF65-F5344CB8AC3E}">
-        <p14:creationId xmlns:p14="http://schemas.microsoft.com/office/powerpoint/2010/main" xmlns="" val="2734221090"/>
+        <p14:creationId xmlns:p14="http://schemas.microsoft.com/office/powerpoint/2010/main" val="2734221090"/>
       </p:ext>
     </p:extLst>
   </p:cSld>
   <p:clrMapOvr>
     <a:masterClrMapping/>
   </p:clrMapOvr>
+  <p:timing>
+    <p:tnLst>
+      <p:par>
+        <p:cTn xmlns:p14="http://schemas.microsoft.com/office/powerpoint/2010/main" id="1" dur="indefinite" restart="never" nodeType="tmRoot">
+          <p:childTnLst>
+            <p:seq concurrent="1" nextAc="seek">
+              <p:cTn id="2" dur="indefinite" nodeType="mainSeq">
+                <p:childTnLst>
+                  <p:par>
+                    <p:cTn id="3" fill="hold">
+                      <p:stCondLst>
+                        <p:cond delay="indefinite"/>
+                      </p:stCondLst>
+                      <p:childTnLst>
+                        <p:par>
+                          <p:cTn id="4" fill="hold">
+                            <p:stCondLst>
+                              <p:cond delay="0"/>
+                            </p:stCondLst>
+                            <p:childTnLst>
+                              <p:par>
+                                <p:cTn id="5" presetID="1" presetClass="entr" presetSubtype="0" fill="hold" nodeType="clickEffect">
+                                  <p:stCondLst>
+                                    <p:cond delay="0"/>
+                                  </p:stCondLst>
+                                  <p:childTnLst>
+                                    <p:set>
+                                      <p:cBhvr>
+                                        <p:cTn id="6" dur="1" fill="hold">
+                                          <p:stCondLst>
+                                            <p:cond delay="0"/>
+                                          </p:stCondLst>
+                                        </p:cTn>
+                                        <p:tgtEl>
+                                          <p:spTgt spid="3">
+                                            <p:txEl>
+                                              <p:pRg st="0" end="0"/>
+                                            </p:txEl>
+                                          </p:spTgt>
+                                        </p:tgtEl>
+                                        <p:attrNameLst>
+                                          <p:attrName>style.visibility</p:attrName>
+                                        </p:attrNameLst>
+                                      </p:cBhvr>
+                                      <p:to>
+                                        <p:strVal val="visible"/>
+                                      </p:to>
+                                    </p:set>
+                                  </p:childTnLst>
+                                </p:cTn>
+                              </p:par>
+                              <p:par>
+                                <p:cTn id="7" presetID="1" presetClass="entr" presetSubtype="0" fill="hold" nodeType="withEffect">
+                                  <p:stCondLst>
+                                    <p:cond delay="0"/>
+                                  </p:stCondLst>
+                                  <p:childTnLst>
+                                    <p:set>
+                                      <p:cBhvr>
+                                        <p:cTn id="8" dur="1" fill="hold">
+                                          <p:stCondLst>
+                                            <p:cond delay="0"/>
+                                          </p:stCondLst>
+                                        </p:cTn>
+                                        <p:tgtEl>
+                                          <p:spTgt spid="7">
+                                            <p:txEl>
+                                              <p:pRg st="0" end="0"/>
+                                            </p:txEl>
+                                          </p:spTgt>
+                                        </p:tgtEl>
+                                        <p:attrNameLst>
+                                          <p:attrName>style.visibility</p:attrName>
+                                        </p:attrNameLst>
+                                      </p:cBhvr>
+                                      <p:to>
+                                        <p:strVal val="visible"/>
+                                      </p:to>
+                                    </p:set>
+                                  </p:childTnLst>
+                                </p:cTn>
+                              </p:par>
+                            </p:childTnLst>
+                          </p:cTn>
+                        </p:par>
+                      </p:childTnLst>
+                    </p:cTn>
+                  </p:par>
+                  <p:par>
+                    <p:cTn id="9" fill="hold">
+                      <p:stCondLst>
+                        <p:cond delay="indefinite"/>
+                      </p:stCondLst>
+                      <p:childTnLst>
+                        <p:par>
+                          <p:cTn id="10" fill="hold">
+                            <p:stCondLst>
+                              <p:cond delay="0"/>
+                            </p:stCondLst>
+                            <p:childTnLst>
+                              <p:par>
+                                <p:cTn id="11" presetID="1" presetClass="entr" presetSubtype="0" fill="hold" nodeType="clickEffect">
+                                  <p:stCondLst>
+                                    <p:cond delay="0"/>
+                                  </p:stCondLst>
+                                  <p:childTnLst>
+                                    <p:set>
+                                      <p:cBhvr>
+                                        <p:cTn id="12" dur="1" fill="hold">
+                                          <p:stCondLst>
+                                            <p:cond delay="0"/>
+                                          </p:stCondLst>
+                                        </p:cTn>
+                                        <p:tgtEl>
+                                          <p:spTgt spid="3">
+                                            <p:txEl>
+                                              <p:pRg st="2" end="2"/>
+                                            </p:txEl>
+                                          </p:spTgt>
+                                        </p:tgtEl>
+                                        <p:attrNameLst>
+                                          <p:attrName>style.visibility</p:attrName>
+                                        </p:attrNameLst>
+                                      </p:cBhvr>
+                                      <p:to>
+                                        <p:strVal val="visible"/>
+                                      </p:to>
+                                    </p:set>
+                                  </p:childTnLst>
+                                </p:cTn>
+                              </p:par>
+                            </p:childTnLst>
+                          </p:cTn>
+                        </p:par>
+                      </p:childTnLst>
+                    </p:cTn>
+                  </p:par>
+                  <p:par>
+                    <p:cTn id="13" fill="hold">
+                      <p:stCondLst>
+                        <p:cond delay="indefinite"/>
+                      </p:stCondLst>
+                      <p:childTnLst>
+                        <p:par>
+                          <p:cTn id="14" fill="hold">
+                            <p:stCondLst>
+                              <p:cond delay="0"/>
+                            </p:stCondLst>
+                            <p:childTnLst>
+                              <p:par>
+                                <p:cTn id="15" presetID="1" presetClass="entr" presetSubtype="0" fill="hold" nodeType="clickEffect">
+                                  <p:stCondLst>
+                                    <p:cond delay="0"/>
+                                  </p:stCondLst>
+                                  <p:childTnLst>
+                                    <p:set>
+                                      <p:cBhvr>
+                                        <p:cTn id="16" dur="1" fill="hold">
+                                          <p:stCondLst>
+                                            <p:cond delay="0"/>
+                                          </p:stCondLst>
+                                        </p:cTn>
+                                        <p:tgtEl>
+                                          <p:spTgt spid="3">
+                                            <p:txEl>
+                                              <p:pRg st="4" end="4"/>
+                                            </p:txEl>
+                                          </p:spTgt>
+                                        </p:tgtEl>
+                                        <p:attrNameLst>
+                                          <p:attrName>style.visibility</p:attrName>
+                                        </p:attrNameLst>
+                                      </p:cBhvr>
+                                      <p:to>
+                                        <p:strVal val="visible"/>
+                                      </p:to>
+                                    </p:set>
+                                  </p:childTnLst>
+                                </p:cTn>
+                              </p:par>
+                            </p:childTnLst>
+                          </p:cTn>
+                        </p:par>
+                      </p:childTnLst>
+                    </p:cTn>
+                  </p:par>
+                  <p:par>
+                    <p:cTn id="17" fill="hold">
+                      <p:stCondLst>
+                        <p:cond delay="indefinite"/>
+                      </p:stCondLst>
+                      <p:childTnLst>
+                        <p:par>
+                          <p:cTn id="18" fill="hold">
+                            <p:stCondLst>
+                              <p:cond delay="0"/>
+                            </p:stCondLst>
+                            <p:childTnLst>
+                              <p:par>
+                                <p:cTn id="19" presetID="1" presetClass="entr" presetSubtype="0" fill="hold" nodeType="clickEffect">
+                                  <p:stCondLst>
+                                    <p:cond delay="0"/>
+                                  </p:stCondLst>
+                                  <p:childTnLst>
+                                    <p:set>
+                                      <p:cBhvr>
+                                        <p:cTn id="20" dur="1" fill="hold">
+                                          <p:stCondLst>
+                                            <p:cond delay="0"/>
+                                          </p:stCondLst>
+                                        </p:cTn>
+                                        <p:tgtEl>
+                                          <p:spTgt spid="3">
+                                            <p:txEl>
+                                              <p:pRg st="6" end="6"/>
+                                            </p:txEl>
+                                          </p:spTgt>
+                                        </p:tgtEl>
+                                        <p:attrNameLst>
+                                          <p:attrName>style.visibility</p:attrName>
+                                        </p:attrNameLst>
+                                      </p:cBhvr>
+                                      <p:to>
+                                        <p:strVal val="visible"/>
+                                      </p:to>
+                                    </p:set>
+                                  </p:childTnLst>
+                                </p:cTn>
+                              </p:par>
+                            </p:childTnLst>
+                          </p:cTn>
+                        </p:par>
+                      </p:childTnLst>
+                    </p:cTn>
+                  </p:par>
+                  <p:par>
+                    <p:cTn id="21" fill="hold">
+                      <p:stCondLst>
+                        <p:cond delay="indefinite"/>
+                      </p:stCondLst>
+                      <p:childTnLst>
+                        <p:par>
+                          <p:cTn id="22" fill="hold">
+                            <p:stCondLst>
+                              <p:cond delay="0"/>
+                            </p:stCondLst>
+                            <p:childTnLst>
+                              <p:par>
+                                <p:cTn id="23" presetID="1" presetClass="entr" presetSubtype="0" fill="hold" nodeType="clickEffect">
+                                  <p:stCondLst>
+                                    <p:cond delay="0"/>
+                                  </p:stCondLst>
+                                  <p:childTnLst>
+                                    <p:set>
+                                      <p:cBhvr>
+                                        <p:cTn id="24" dur="1" fill="hold">
+                                          <p:stCondLst>
+                                            <p:cond delay="0"/>
+                                          </p:stCondLst>
+                                        </p:cTn>
+                                        <p:tgtEl>
+                                          <p:spTgt spid="3">
+                                            <p:txEl>
+                                              <p:pRg st="8" end="8"/>
+                                            </p:txEl>
+                                          </p:spTgt>
+                                        </p:tgtEl>
+                                        <p:attrNameLst>
+                                          <p:attrName>style.visibility</p:attrName>
+                                        </p:attrNameLst>
+                                      </p:cBhvr>
+                                      <p:to>
+                                        <p:strVal val="visible"/>
+                                      </p:to>
+                                    </p:set>
+                                  </p:childTnLst>
+                                </p:cTn>
+                              </p:par>
+                            </p:childTnLst>
+                          </p:cTn>
+                        </p:par>
+                      </p:childTnLst>
+                    </p:cTn>
+                  </p:par>
+                  <p:par>
+                    <p:cTn id="25" fill="hold">
+                      <p:stCondLst>
+                        <p:cond delay="indefinite"/>
+                      </p:stCondLst>
+                      <p:childTnLst>
+                        <p:par>
+                          <p:cTn id="26" fill="hold">
+                            <p:stCondLst>
+                              <p:cond delay="0"/>
+                            </p:stCondLst>
+                            <p:childTnLst>
+                              <p:par>
+                                <p:cTn id="27" presetID="1" presetClass="entr" presetSubtype="0" fill="hold" nodeType="clickEffect">
+                                  <p:stCondLst>
+                                    <p:cond delay="0"/>
+                                  </p:stCondLst>
+                                  <p:childTnLst>
+                                    <p:set>
+                                      <p:cBhvr>
+                                        <p:cTn id="28" dur="1" fill="hold">
+                                          <p:stCondLst>
+                                            <p:cond delay="0"/>
+                                          </p:stCondLst>
+                                        </p:cTn>
+                                        <p:tgtEl>
+                                          <p:spTgt spid="3">
+                                            <p:txEl>
+                                              <p:pRg st="10" end="10"/>
+                                            </p:txEl>
+                                          </p:spTgt>
+                                        </p:tgtEl>
+                                        <p:attrNameLst>
+                                          <p:attrName>style.visibility</p:attrName>
+                                        </p:attrNameLst>
+                                      </p:cBhvr>
+                                      <p:to>
+                                        <p:strVal val="visible"/>
+                                      </p:to>
+                                    </p:set>
+                                  </p:childTnLst>
+                                </p:cTn>
+                              </p:par>
+                            </p:childTnLst>
+                          </p:cTn>
+                        </p:par>
+                      </p:childTnLst>
+                    </p:cTn>
+                  </p:par>
+                </p:childTnLst>
+              </p:cTn>
+              <p:prevCondLst>
+                <p:cond evt="onPrev" delay="0">
+                  <p:tgtEl>
+                    <p:sldTgt/>
+                  </p:tgtEl>
+                </p:cond>
+              </p:prevCondLst>
+              <p:nextCondLst>
+                <p:cond evt="onNext" delay="0">
+                  <p:tgtEl>
+                    <p:sldTgt/>
+                  </p:tgtEl>
+                </p:cond>
+              </p:nextCondLst>
+            </p:seq>
+          </p:childTnLst>
+        </p:cTn>
+      </p:par>
+    </p:tnLst>
+  </p:timing>
 </p:sld>
 </file>
 
@@ -4035,8 +4398,24 @@
             </a:r>
             <a:r>
               <a:rPr lang="en-US" dirty="0" smtClean="0"/>
-              <a:t> function</a:t>
-            </a:r>
+              <a:t> </a:t>
+            </a:r>
+            <a:r>
+              <a:rPr lang="en-US" dirty="0" smtClean="0"/>
+              <a:t>function (in </a:t>
+            </a:r>
+            <a:r>
+              <a:rPr lang="en-US" dirty="0" err="1" smtClean="0">
+                <a:latin typeface="Lucida Console"/>
+                <a:cs typeface="Lucida Console"/>
+              </a:rPr>
+              <a:t>metafor</a:t>
+            </a:r>
+            <a:r>
+              <a:rPr lang="en-US" dirty="0" smtClean="0"/>
+              <a:t> package) </a:t>
+            </a:r>
+            <a:endParaRPr lang="en-US" dirty="0" smtClean="0"/>
           </a:p>
           <a:p>
             <a:pPr marL="914400" lvl="1" indent="-514350"/>
@@ -4069,8 +4448,17 @@
               <a:rPr lang="en-US" dirty="0" smtClean="0">
                 <a:cs typeface="Lucida Console"/>
               </a:rPr>
-              <a:t> function (meta regression)</a:t>
-            </a:r>
+              <a:t> function (meta regression</a:t>
+            </a:r>
+            <a:r>
+              <a:rPr lang="en-US" dirty="0" smtClean="0">
+                <a:cs typeface="Lucida Console"/>
+              </a:rPr>
+              <a:t>)</a:t>
+            </a:r>
+            <a:endParaRPr lang="en-US" dirty="0" smtClean="0">
+              <a:cs typeface="Lucida Console"/>
+            </a:endParaRPr>
           </a:p>
           <a:p>
             <a:pPr marL="914400" lvl="1" indent="-514350"/>
@@ -4089,8 +4477,15 @@
           <a:p>
             <a:pPr marL="914400" lvl="1" indent="-514350"/>
             <a:r>
+              <a:rPr lang="en-US" dirty="0" smtClean="0">
+                <a:latin typeface="Lucida Console"/>
+                <a:cs typeface="Lucida Console"/>
+              </a:rPr>
+              <a:t>Funnel</a:t>
+            </a:r>
+            <a:r>
               <a:rPr lang="en-US" dirty="0" smtClean="0"/>
-              <a:t>Funnel plot, Fail-Safe N analysis</a:t>
+              <a:t> plot, Fail-Safe N analysis</a:t>
             </a:r>
           </a:p>
           <a:p>
@@ -4110,10 +4505,16 @@
           <a:p>
             <a:pPr marL="914400" lvl="1" indent="-514350"/>
             <a:r>
+              <a:rPr lang="en-US" dirty="0" smtClean="0">
+                <a:latin typeface="Lucida Console"/>
+                <a:cs typeface="Lucida Console"/>
+              </a:rPr>
+              <a:t>Leave1out</a:t>
+            </a:r>
+            <a:r>
               <a:rPr lang="en-US" dirty="0" smtClean="0"/>
-              <a:t>Leave1out analysis</a:t>
-            </a:r>
-            <a:endParaRPr lang="en-US" dirty="0" smtClean="0"/>
+              <a:t> analysis</a:t>
+            </a:r>
           </a:p>
         </p:txBody>
       </p:sp>
@@ -4155,13 +4556,239 @@
     </p:spTree>
     <p:extLst>
       <p:ext uri="{BB962C8B-B14F-4D97-AF65-F5344CB8AC3E}">
-        <p14:creationId xmlns:p14="http://schemas.microsoft.com/office/powerpoint/2010/main" xmlns="" val="4148343161"/>
+        <p14:creationId xmlns:p14="http://schemas.microsoft.com/office/powerpoint/2010/main" val="4148343161"/>
       </p:ext>
     </p:extLst>
   </p:cSld>
   <p:clrMapOvr>
     <a:masterClrMapping/>
   </p:clrMapOvr>
+  <p:timing>
+    <p:tnLst>
+      <p:par>
+        <p:cTn xmlns:p14="http://schemas.microsoft.com/office/powerpoint/2010/main" id="1" dur="indefinite" restart="never" nodeType="tmRoot">
+          <p:childTnLst>
+            <p:seq concurrent="1" nextAc="seek">
+              <p:cTn id="2" dur="indefinite" nodeType="mainSeq">
+                <p:childTnLst>
+                  <p:par>
+                    <p:cTn id="3" fill="hold">
+                      <p:stCondLst>
+                        <p:cond delay="indefinite"/>
+                      </p:stCondLst>
+                      <p:childTnLst>
+                        <p:par>
+                          <p:cTn id="4" fill="hold">
+                            <p:stCondLst>
+                              <p:cond delay="0"/>
+                            </p:stCondLst>
+                            <p:childTnLst>
+                              <p:par>
+                                <p:cTn id="5" presetID="1" presetClass="entr" presetSubtype="0" fill="hold" nodeType="clickEffect">
+                                  <p:stCondLst>
+                                    <p:cond delay="0"/>
+                                  </p:stCondLst>
+                                  <p:childTnLst>
+                                    <p:set>
+                                      <p:cBhvr>
+                                        <p:cTn id="6" dur="1" fill="hold">
+                                          <p:stCondLst>
+                                            <p:cond delay="0"/>
+                                          </p:stCondLst>
+                                        </p:cTn>
+                                        <p:tgtEl>
+                                          <p:spTgt spid="3">
+                                            <p:txEl>
+                                              <p:pRg st="2" end="2"/>
+                                            </p:txEl>
+                                          </p:spTgt>
+                                        </p:tgtEl>
+                                        <p:attrNameLst>
+                                          <p:attrName>style.visibility</p:attrName>
+                                        </p:attrNameLst>
+                                      </p:cBhvr>
+                                      <p:to>
+                                        <p:strVal val="visible"/>
+                                      </p:to>
+                                    </p:set>
+                                  </p:childTnLst>
+                                </p:cTn>
+                              </p:par>
+                            </p:childTnLst>
+                          </p:cTn>
+                        </p:par>
+                      </p:childTnLst>
+                    </p:cTn>
+                  </p:par>
+                  <p:par>
+                    <p:cTn id="7" fill="hold">
+                      <p:stCondLst>
+                        <p:cond delay="indefinite"/>
+                      </p:stCondLst>
+                      <p:childTnLst>
+                        <p:par>
+                          <p:cTn id="8" fill="hold">
+                            <p:stCondLst>
+                              <p:cond delay="0"/>
+                            </p:stCondLst>
+                            <p:childTnLst>
+                              <p:par>
+                                <p:cTn id="9" presetID="1" presetClass="entr" presetSubtype="0" fill="hold" nodeType="clickEffect">
+                                  <p:stCondLst>
+                                    <p:cond delay="0"/>
+                                  </p:stCondLst>
+                                  <p:childTnLst>
+                                    <p:set>
+                                      <p:cBhvr>
+                                        <p:cTn id="10" dur="1" fill="hold">
+                                          <p:stCondLst>
+                                            <p:cond delay="0"/>
+                                          </p:stCondLst>
+                                        </p:cTn>
+                                        <p:tgtEl>
+                                          <p:spTgt spid="3">
+                                            <p:txEl>
+                                              <p:pRg st="5" end="5"/>
+                                            </p:txEl>
+                                          </p:spTgt>
+                                        </p:tgtEl>
+                                        <p:attrNameLst>
+                                          <p:attrName>style.visibility</p:attrName>
+                                        </p:attrNameLst>
+                                      </p:cBhvr>
+                                      <p:to>
+                                        <p:strVal val="visible"/>
+                                      </p:to>
+                                    </p:set>
+                                  </p:childTnLst>
+                                </p:cTn>
+                              </p:par>
+                            </p:childTnLst>
+                          </p:cTn>
+                        </p:par>
+                      </p:childTnLst>
+                    </p:cTn>
+                  </p:par>
+                  <p:par>
+                    <p:cTn id="11" fill="hold">
+                      <p:stCondLst>
+                        <p:cond delay="indefinite"/>
+                      </p:stCondLst>
+                      <p:childTnLst>
+                        <p:par>
+                          <p:cTn id="12" fill="hold">
+                            <p:stCondLst>
+                              <p:cond delay="0"/>
+                            </p:stCondLst>
+                            <p:childTnLst>
+                              <p:par>
+                                <p:cTn id="13" presetID="1" presetClass="entr" presetSubtype="0" fill="hold" nodeType="clickEffect">
+                                  <p:stCondLst>
+                                    <p:cond delay="0"/>
+                                  </p:stCondLst>
+                                  <p:childTnLst>
+                                    <p:set>
+                                      <p:cBhvr>
+                                        <p:cTn id="14" dur="1" fill="hold">
+                                          <p:stCondLst>
+                                            <p:cond delay="0"/>
+                                          </p:stCondLst>
+                                        </p:cTn>
+                                        <p:tgtEl>
+                                          <p:spTgt spid="3">
+                                            <p:txEl>
+                                              <p:pRg st="8" end="8"/>
+                                            </p:txEl>
+                                          </p:spTgt>
+                                        </p:tgtEl>
+                                        <p:attrNameLst>
+                                          <p:attrName>style.visibility</p:attrName>
+                                        </p:attrNameLst>
+                                      </p:cBhvr>
+                                      <p:to>
+                                        <p:strVal val="visible"/>
+                                      </p:to>
+                                    </p:set>
+                                  </p:childTnLst>
+                                </p:cTn>
+                              </p:par>
+                            </p:childTnLst>
+                          </p:cTn>
+                        </p:par>
+                      </p:childTnLst>
+                    </p:cTn>
+                  </p:par>
+                  <p:par>
+                    <p:cTn id="15" fill="hold">
+                      <p:stCondLst>
+                        <p:cond delay="indefinite"/>
+                      </p:stCondLst>
+                      <p:childTnLst>
+                        <p:par>
+                          <p:cTn id="16" fill="hold">
+                            <p:stCondLst>
+                              <p:cond delay="0"/>
+                            </p:stCondLst>
+                            <p:childTnLst>
+                              <p:par>
+                                <p:cTn id="17" presetID="1" presetClass="entr" presetSubtype="0" fill="hold" nodeType="clickEffect">
+                                  <p:stCondLst>
+                                    <p:cond delay="0"/>
+                                  </p:stCondLst>
+                                  <p:childTnLst>
+                                    <p:set>
+                                      <p:cBhvr>
+                                        <p:cTn id="18" dur="1" fill="hold">
+                                          <p:stCondLst>
+                                            <p:cond delay="0"/>
+                                          </p:stCondLst>
+                                        </p:cTn>
+                                        <p:tgtEl>
+                                          <p:spTgt spid="3">
+                                            <p:txEl>
+                                              <p:pRg st="11" end="11"/>
+                                            </p:txEl>
+                                          </p:spTgt>
+                                        </p:tgtEl>
+                                        <p:attrNameLst>
+                                          <p:attrName>style.visibility</p:attrName>
+                                        </p:attrNameLst>
+                                      </p:cBhvr>
+                                      <p:to>
+                                        <p:strVal val="visible"/>
+                                      </p:to>
+                                    </p:set>
+                                  </p:childTnLst>
+                                </p:cTn>
+                              </p:par>
+                            </p:childTnLst>
+                          </p:cTn>
+                        </p:par>
+                      </p:childTnLst>
+                    </p:cTn>
+                  </p:par>
+                </p:childTnLst>
+              </p:cTn>
+              <p:prevCondLst>
+                <p:cond evt="onPrev" delay="0">
+                  <p:tgtEl>
+                    <p:sldTgt/>
+                  </p:tgtEl>
+                </p:cond>
+              </p:prevCondLst>
+              <p:nextCondLst>
+                <p:cond evt="onNext" delay="0">
+                  <p:tgtEl>
+                    <p:sldTgt/>
+                  </p:tgtEl>
+                </p:cond>
+              </p:nextCondLst>
+            </p:seq>
+          </p:childTnLst>
+        </p:cTn>
+      </p:par>
+    </p:tnLst>
+  </p:timing>
 </p:sld>
 </file>
 
@@ -4195,7 +4822,7 @@
         <p:spPr>
           <a:xfrm>
             <a:off x="457200" y="5758"/>
-            <a:ext cx="3008313" cy="1162050"/>
+            <a:ext cx="3008313" cy="696477"/>
           </a:xfrm>
         </p:spPr>
         <p:txBody>
@@ -4207,22 +4834,7 @@
             <a:pPr algn="ctr"/>
             <a:r>
               <a:rPr lang="en-US" dirty="0" smtClean="0"/>
-              <a:t>Meta-</a:t>
-            </a:r>
-            <a:r>
-              <a:rPr lang="en-US" dirty="0" smtClean="0"/>
-              <a:t>A</a:t>
-            </a:r>
-            <a:r>
-              <a:rPr lang="en-US" dirty="0" smtClean="0"/>
-              <a:t>nalysis in one slide: </a:t>
-            </a:r>
-            <a:br>
-              <a:rPr lang="en-US" dirty="0" smtClean="0"/>
-            </a:br>
-            <a:r>
-              <a:rPr lang="en-US" dirty="0" smtClean="0"/>
-              <a:t>Forest plot!</a:t>
+              <a:t>Meta-Analysis in one slide: </a:t>
             </a:r>
             <a:endParaRPr lang="en-US" dirty="0"/>
           </a:p>
@@ -4255,7 +4867,7 @@
               <a:buChar char="-"/>
             </a:pPr>
             <a:r>
-              <a:rPr lang="en-US" sz="1800" dirty="0" smtClean="0"/>
+              <a:rPr lang="en-US" sz="1850" dirty="0" smtClean="0"/>
               <a:t>Dataset: Gibson et. al 2011</a:t>
             </a:r>
           </a:p>
@@ -4264,7 +4876,7 @@
               <a:buFontTx/>
               <a:buChar char="-"/>
             </a:pPr>
-            <a:endParaRPr lang="en-US" sz="1800" dirty="0" smtClean="0"/>
+            <a:endParaRPr lang="en-US" sz="1850" dirty="0" smtClean="0"/>
           </a:p>
           <a:p>
             <a:pPr marL="285750" indent="-285750">
@@ -4272,21 +4884,21 @@
               <a:buChar char="-"/>
             </a:pPr>
             <a:r>
-              <a:rPr lang="en-US" sz="1800" dirty="0" smtClean="0"/>
+              <a:rPr lang="en-US" sz="1850" dirty="0" smtClean="0"/>
               <a:t>Subset with only bird </a:t>
             </a:r>
             <a:r>
-              <a:rPr lang="en-US" sz="1800" dirty="0" err="1" smtClean="0"/>
+              <a:rPr lang="en-US" sz="1850" dirty="0" err="1" smtClean="0"/>
               <a:t>taxon</a:t>
             </a:r>
-            <a:endParaRPr lang="en-US" sz="1800" dirty="0" smtClean="0"/>
+            <a:endParaRPr lang="en-US" sz="1850" dirty="0" smtClean="0"/>
           </a:p>
           <a:p>
             <a:pPr marL="285750" indent="-285750">
               <a:buFontTx/>
               <a:buChar char="-"/>
             </a:pPr>
-            <a:endParaRPr lang="en-US" sz="1800" dirty="0" smtClean="0"/>
+            <a:endParaRPr lang="en-US" sz="1850" dirty="0" smtClean="0"/>
           </a:p>
           <a:p>
             <a:pPr marL="285750" indent="-285750">
@@ -4294,7 +4906,7 @@
               <a:buChar char="-"/>
             </a:pPr>
             <a:r>
-              <a:rPr lang="en-US" sz="1800" dirty="0" smtClean="0"/>
+              <a:rPr lang="en-US" sz="1850" dirty="0" smtClean="0"/>
               <a:t>Only 1 species per study selected (randomly)</a:t>
             </a:r>
           </a:p>
@@ -4303,7 +4915,7 @@
               <a:buFontTx/>
               <a:buChar char="-"/>
             </a:pPr>
-            <a:endParaRPr lang="en-US" sz="1800" dirty="0" smtClean="0"/>
+            <a:endParaRPr lang="en-US" sz="1850" dirty="0" smtClean="0"/>
           </a:p>
           <a:p>
             <a:pPr marL="285750" indent="-285750">
@@ -4311,7 +4923,7 @@
               <a:buChar char="-"/>
             </a:pPr>
             <a:r>
-              <a:rPr lang="en-US" sz="1800" dirty="0" smtClean="0"/>
+              <a:rPr lang="en-US" sz="1850" dirty="0" smtClean="0"/>
               <a:t>From n=2220 to n=38, so extremely simplified</a:t>
             </a:r>
           </a:p>
@@ -4320,7 +4932,7 @@
               <a:buFontTx/>
               <a:buChar char="-"/>
             </a:pPr>
-            <a:endParaRPr lang="en-US" sz="1800" dirty="0" smtClean="0"/>
+            <a:endParaRPr lang="en-US" sz="1850" dirty="0" smtClean="0"/>
           </a:p>
           <a:p>
             <a:pPr marL="285750" indent="-285750">
@@ -4328,7 +4940,7 @@
               <a:buChar char="-"/>
             </a:pPr>
             <a:r>
-              <a:rPr lang="en-US" sz="1800" dirty="0" smtClean="0"/>
+              <a:rPr lang="en-US" sz="1850" dirty="0" smtClean="0"/>
               <a:t>The steps presented in the slide before implemented</a:t>
             </a:r>
           </a:p>
@@ -4337,7 +4949,7 @@
               <a:buFontTx/>
               <a:buChar char="-"/>
             </a:pPr>
-            <a:endParaRPr lang="en-US" sz="1800" dirty="0" smtClean="0"/>
+            <a:endParaRPr lang="en-US" sz="1850" dirty="0" smtClean="0"/>
           </a:p>
           <a:p>
             <a:pPr marL="285750" indent="-285750">
@@ -4345,39 +4957,14 @@
               <a:buChar char="-"/>
             </a:pPr>
             <a:r>
-              <a:rPr lang="en-US" sz="1800" dirty="0" smtClean="0"/>
-              <a:t>And voila! Here’s our result!</a:t>
-            </a:r>
-          </a:p>
-          <a:p>
-            <a:pPr marL="285750" indent="-285750">
-              <a:buFontTx/>
-              <a:buChar char="-"/>
-            </a:pPr>
-            <a:endParaRPr lang="en-US" sz="1800" dirty="0" smtClean="0"/>
-          </a:p>
-          <a:p>
-            <a:pPr marL="285750" indent="-285750">
-              <a:buFontTx/>
-              <a:buChar char="-"/>
-            </a:pPr>
-            <a:r>
-              <a:rPr lang="en-US" sz="1800" dirty="0"/>
-              <a:t>M</a:t>
-            </a:r>
-            <a:r>
-              <a:rPr lang="en-US" sz="1800" dirty="0" smtClean="0"/>
-              <a:t>ore </a:t>
-            </a:r>
-            <a:r>
-              <a:rPr lang="en-US" sz="1800" dirty="0" smtClean="0"/>
-              <a:t>figures can be shown </a:t>
-            </a:r>
-            <a:r>
-              <a:rPr lang="en-US" sz="1800" dirty="0" smtClean="0"/>
-              <a:t>on request</a:t>
-            </a:r>
-            <a:endParaRPr lang="en-US" sz="1800" dirty="0"/>
+              <a:rPr lang="en-US" sz="1850" dirty="0" smtClean="0"/>
+              <a:t>And voila! Here’s our result</a:t>
+            </a:r>
+            <a:r>
+              <a:rPr lang="en-US" sz="1850" dirty="0" smtClean="0"/>
+              <a:t>!</a:t>
+            </a:r>
+            <a:endParaRPr lang="en-US" sz="1850" dirty="0" smtClean="0"/>
           </a:p>
         </p:txBody>
       </p:sp>
@@ -4450,16 +5037,634 @@
           </a:fontRef>
         </p:style>
       </p:cxnSp>
+      <p:sp>
+        <p:nvSpPr>
+          <p:cNvPr id="3" name="TekstSylinder 2"/>
+          <p:cNvSpPr txBox="1"/>
+          <p:nvPr/>
+        </p:nvSpPr>
+        <p:spPr>
+          <a:xfrm>
+            <a:off x="666377" y="654110"/>
+            <a:ext cx="2510118" cy="400110"/>
+          </a:xfrm>
+          <a:prstGeom prst="rect">
+            <a:avLst/>
+          </a:prstGeom>
+          <a:noFill/>
+        </p:spPr>
+        <p:txBody>
+          <a:bodyPr wrap="square" rtlCol="0">
+            <a:spAutoFit/>
+          </a:bodyPr>
+          <a:lstStyle/>
+          <a:p>
+            <a:pPr algn="ctr"/>
+            <a:r>
+              <a:rPr lang="en-US" sz="2000" b="1" dirty="0">
+                <a:latin typeface="+mj-lt"/>
+              </a:rPr>
+              <a:t>Forest plot!</a:t>
+            </a:r>
+            <a:endParaRPr lang="nb-NO" sz="2000" b="1" dirty="0">
+              <a:latin typeface="+mj-lt"/>
+            </a:endParaRPr>
+          </a:p>
+        </p:txBody>
+      </p:sp>
     </p:spTree>
     <p:extLst>
       <p:ext uri="{BB962C8B-B14F-4D97-AF65-F5344CB8AC3E}">
-        <p14:creationId xmlns:p14="http://schemas.microsoft.com/office/powerpoint/2010/main" xmlns="" val="756268187"/>
+        <p14:creationId xmlns:p14="http://schemas.microsoft.com/office/powerpoint/2010/main" val="756268187"/>
       </p:ext>
     </p:extLst>
   </p:cSld>
   <p:clrMapOvr>
     <a:masterClrMapping/>
   </p:clrMapOvr>
+  <p:timing>
+    <p:tnLst>
+      <p:par>
+        <p:cTn xmlns:p14="http://schemas.microsoft.com/office/powerpoint/2010/main" id="1" dur="indefinite" restart="never" nodeType="tmRoot">
+          <p:childTnLst>
+            <p:seq concurrent="1" nextAc="seek">
+              <p:cTn id="2" dur="indefinite" nodeType="mainSeq">
+                <p:childTnLst>
+                  <p:par>
+                    <p:cTn id="3" fill="hold">
+                      <p:stCondLst>
+                        <p:cond delay="indefinite"/>
+                      </p:stCondLst>
+                      <p:childTnLst>
+                        <p:par>
+                          <p:cTn id="4" fill="hold">
+                            <p:stCondLst>
+                              <p:cond delay="0"/>
+                            </p:stCondLst>
+                            <p:childTnLst>
+                              <p:par>
+                                <p:cTn id="5" presetID="1" presetClass="entr" presetSubtype="0" fill="hold" nodeType="clickEffect">
+                                  <p:stCondLst>
+                                    <p:cond delay="0"/>
+                                  </p:stCondLst>
+                                  <p:childTnLst>
+                                    <p:set>
+                                      <p:cBhvr>
+                                        <p:cTn id="6" dur="1" fill="hold">
+                                          <p:stCondLst>
+                                            <p:cond delay="0"/>
+                                          </p:stCondLst>
+                                        </p:cTn>
+                                        <p:tgtEl>
+                                          <p:spTgt spid="4">
+                                            <p:txEl>
+                                              <p:pRg st="0" end="0"/>
+                                            </p:txEl>
+                                          </p:spTgt>
+                                        </p:tgtEl>
+                                        <p:attrNameLst>
+                                          <p:attrName>style.visibility</p:attrName>
+                                        </p:attrNameLst>
+                                      </p:cBhvr>
+                                      <p:to>
+                                        <p:strVal val="visible"/>
+                                      </p:to>
+                                    </p:set>
+                                  </p:childTnLst>
+                                </p:cTn>
+                              </p:par>
+                            </p:childTnLst>
+                          </p:cTn>
+                        </p:par>
+                      </p:childTnLst>
+                    </p:cTn>
+                  </p:par>
+                  <p:par>
+                    <p:cTn id="7" fill="hold">
+                      <p:stCondLst>
+                        <p:cond delay="indefinite"/>
+                      </p:stCondLst>
+                      <p:childTnLst>
+                        <p:par>
+                          <p:cTn id="8" fill="hold">
+                            <p:stCondLst>
+                              <p:cond delay="0"/>
+                            </p:stCondLst>
+                            <p:childTnLst>
+                              <p:par>
+                                <p:cTn id="9" presetID="1" presetClass="entr" presetSubtype="0" fill="hold" nodeType="clickEffect">
+                                  <p:stCondLst>
+                                    <p:cond delay="0"/>
+                                  </p:stCondLst>
+                                  <p:childTnLst>
+                                    <p:set>
+                                      <p:cBhvr>
+                                        <p:cTn id="10" dur="1" fill="hold">
+                                          <p:stCondLst>
+                                            <p:cond delay="0"/>
+                                          </p:stCondLst>
+                                        </p:cTn>
+                                        <p:tgtEl>
+                                          <p:spTgt spid="4">
+                                            <p:txEl>
+                                              <p:pRg st="2" end="2"/>
+                                            </p:txEl>
+                                          </p:spTgt>
+                                        </p:tgtEl>
+                                        <p:attrNameLst>
+                                          <p:attrName>style.visibility</p:attrName>
+                                        </p:attrNameLst>
+                                      </p:cBhvr>
+                                      <p:to>
+                                        <p:strVal val="visible"/>
+                                      </p:to>
+                                    </p:set>
+                                  </p:childTnLst>
+                                </p:cTn>
+                              </p:par>
+                            </p:childTnLst>
+                          </p:cTn>
+                        </p:par>
+                      </p:childTnLst>
+                    </p:cTn>
+                  </p:par>
+                  <p:par>
+                    <p:cTn id="11" fill="hold">
+                      <p:stCondLst>
+                        <p:cond delay="indefinite"/>
+                      </p:stCondLst>
+                      <p:childTnLst>
+                        <p:par>
+                          <p:cTn id="12" fill="hold">
+                            <p:stCondLst>
+                              <p:cond delay="0"/>
+                            </p:stCondLst>
+                            <p:childTnLst>
+                              <p:par>
+                                <p:cTn id="13" presetID="1" presetClass="entr" presetSubtype="0" fill="hold" nodeType="clickEffect">
+                                  <p:stCondLst>
+                                    <p:cond delay="0"/>
+                                  </p:stCondLst>
+                                  <p:childTnLst>
+                                    <p:set>
+                                      <p:cBhvr>
+                                        <p:cTn id="14" dur="1" fill="hold">
+                                          <p:stCondLst>
+                                            <p:cond delay="0"/>
+                                          </p:stCondLst>
+                                        </p:cTn>
+                                        <p:tgtEl>
+                                          <p:spTgt spid="4">
+                                            <p:txEl>
+                                              <p:pRg st="4" end="4"/>
+                                            </p:txEl>
+                                          </p:spTgt>
+                                        </p:tgtEl>
+                                        <p:attrNameLst>
+                                          <p:attrName>style.visibility</p:attrName>
+                                        </p:attrNameLst>
+                                      </p:cBhvr>
+                                      <p:to>
+                                        <p:strVal val="visible"/>
+                                      </p:to>
+                                    </p:set>
+                                  </p:childTnLst>
+                                </p:cTn>
+                              </p:par>
+                            </p:childTnLst>
+                          </p:cTn>
+                        </p:par>
+                      </p:childTnLst>
+                    </p:cTn>
+                  </p:par>
+                  <p:par>
+                    <p:cTn id="15" fill="hold">
+                      <p:stCondLst>
+                        <p:cond delay="indefinite"/>
+                      </p:stCondLst>
+                      <p:childTnLst>
+                        <p:par>
+                          <p:cTn id="16" fill="hold">
+                            <p:stCondLst>
+                              <p:cond delay="0"/>
+                            </p:stCondLst>
+                            <p:childTnLst>
+                              <p:par>
+                                <p:cTn id="17" presetID="1" presetClass="entr" presetSubtype="0" fill="hold" nodeType="clickEffect">
+                                  <p:stCondLst>
+                                    <p:cond delay="0"/>
+                                  </p:stCondLst>
+                                  <p:childTnLst>
+                                    <p:set>
+                                      <p:cBhvr>
+                                        <p:cTn id="18" dur="1" fill="hold">
+                                          <p:stCondLst>
+                                            <p:cond delay="0"/>
+                                          </p:stCondLst>
+                                        </p:cTn>
+                                        <p:tgtEl>
+                                          <p:spTgt spid="4">
+                                            <p:txEl>
+                                              <p:pRg st="6" end="6"/>
+                                            </p:txEl>
+                                          </p:spTgt>
+                                        </p:tgtEl>
+                                        <p:attrNameLst>
+                                          <p:attrName>style.visibility</p:attrName>
+                                        </p:attrNameLst>
+                                      </p:cBhvr>
+                                      <p:to>
+                                        <p:strVal val="visible"/>
+                                      </p:to>
+                                    </p:set>
+                                  </p:childTnLst>
+                                </p:cTn>
+                              </p:par>
+                            </p:childTnLst>
+                          </p:cTn>
+                        </p:par>
+                      </p:childTnLst>
+                    </p:cTn>
+                  </p:par>
+                  <p:par>
+                    <p:cTn id="19" fill="hold">
+                      <p:stCondLst>
+                        <p:cond delay="indefinite"/>
+                      </p:stCondLst>
+                      <p:childTnLst>
+                        <p:par>
+                          <p:cTn id="20" fill="hold">
+                            <p:stCondLst>
+                              <p:cond delay="0"/>
+                            </p:stCondLst>
+                            <p:childTnLst>
+                              <p:par>
+                                <p:cTn id="21" presetID="1" presetClass="entr" presetSubtype="0" fill="hold" nodeType="clickEffect">
+                                  <p:stCondLst>
+                                    <p:cond delay="0"/>
+                                  </p:stCondLst>
+                                  <p:childTnLst>
+                                    <p:set>
+                                      <p:cBhvr>
+                                        <p:cTn id="22" dur="1" fill="hold">
+                                          <p:stCondLst>
+                                            <p:cond delay="0"/>
+                                          </p:stCondLst>
+                                        </p:cTn>
+                                        <p:tgtEl>
+                                          <p:spTgt spid="4">
+                                            <p:txEl>
+                                              <p:pRg st="8" end="8"/>
+                                            </p:txEl>
+                                          </p:spTgt>
+                                        </p:tgtEl>
+                                        <p:attrNameLst>
+                                          <p:attrName>style.visibility</p:attrName>
+                                        </p:attrNameLst>
+                                      </p:cBhvr>
+                                      <p:to>
+                                        <p:strVal val="visible"/>
+                                      </p:to>
+                                    </p:set>
+                                  </p:childTnLst>
+                                </p:cTn>
+                              </p:par>
+                            </p:childTnLst>
+                          </p:cTn>
+                        </p:par>
+                      </p:childTnLst>
+                    </p:cTn>
+                  </p:par>
+                  <p:par>
+                    <p:cTn id="23" fill="hold">
+                      <p:stCondLst>
+                        <p:cond delay="indefinite"/>
+                      </p:stCondLst>
+                      <p:childTnLst>
+                        <p:par>
+                          <p:cTn id="24" fill="hold">
+                            <p:stCondLst>
+                              <p:cond delay="0"/>
+                            </p:stCondLst>
+                            <p:childTnLst>
+                              <p:par>
+                                <p:cTn id="25" presetID="1" presetClass="entr" presetSubtype="0" fill="hold" nodeType="clickEffect">
+                                  <p:stCondLst>
+                                    <p:cond delay="0"/>
+                                  </p:stCondLst>
+                                  <p:childTnLst>
+                                    <p:set>
+                                      <p:cBhvr>
+                                        <p:cTn id="26" dur="1" fill="hold">
+                                          <p:stCondLst>
+                                            <p:cond delay="0"/>
+                                          </p:stCondLst>
+                                        </p:cTn>
+                                        <p:tgtEl>
+                                          <p:spTgt spid="4">
+                                            <p:txEl>
+                                              <p:pRg st="10" end="10"/>
+                                            </p:txEl>
+                                          </p:spTgt>
+                                        </p:tgtEl>
+                                        <p:attrNameLst>
+                                          <p:attrName>style.visibility</p:attrName>
+                                        </p:attrNameLst>
+                                      </p:cBhvr>
+                                      <p:to>
+                                        <p:strVal val="visible"/>
+                                      </p:to>
+                                    </p:set>
+                                  </p:childTnLst>
+                                </p:cTn>
+                              </p:par>
+                            </p:childTnLst>
+                          </p:cTn>
+                        </p:par>
+                      </p:childTnLst>
+                    </p:cTn>
+                  </p:par>
+                  <p:par>
+                    <p:cTn id="27" fill="hold">
+                      <p:stCondLst>
+                        <p:cond delay="indefinite"/>
+                      </p:stCondLst>
+                      <p:childTnLst>
+                        <p:par>
+                          <p:cTn id="28" fill="hold">
+                            <p:stCondLst>
+                              <p:cond delay="0"/>
+                            </p:stCondLst>
+                            <p:childTnLst>
+                              <p:par>
+                                <p:cTn id="29" presetID="15" presetClass="entr" presetSubtype="0" fill="hold" nodeType="clickEffect">
+                                  <p:stCondLst>
+                                    <p:cond delay="0"/>
+                                  </p:stCondLst>
+                                  <p:childTnLst>
+                                    <p:set>
+                                      <p:cBhvr>
+                                        <p:cTn id="30" dur="1" fill="hold">
+                                          <p:stCondLst>
+                                            <p:cond delay="0"/>
+                                          </p:stCondLst>
+                                        </p:cTn>
+                                        <p:tgtEl>
+                                          <p:spTgt spid="1026"/>
+                                        </p:tgtEl>
+                                        <p:attrNameLst>
+                                          <p:attrName>style.visibility</p:attrName>
+                                        </p:attrNameLst>
+                                      </p:cBhvr>
+                                      <p:to>
+                                        <p:strVal val="visible"/>
+                                      </p:to>
+                                    </p:set>
+                                    <p:anim calcmode="lin" valueType="num">
+                                      <p:cBhvr>
+                                        <p:cTn id="31" dur="1000" fill="hold"/>
+                                        <p:tgtEl>
+                                          <p:spTgt spid="1026"/>
+                                        </p:tgtEl>
+                                        <p:attrNameLst>
+                                          <p:attrName>ppt_w</p:attrName>
+                                        </p:attrNameLst>
+                                      </p:cBhvr>
+                                      <p:tavLst>
+                                        <p:tav tm="0">
+                                          <p:val>
+                                            <p:fltVal val="0"/>
+                                          </p:val>
+                                        </p:tav>
+                                        <p:tav tm="100000">
+                                          <p:val>
+                                            <p:strVal val="#ppt_w"/>
+                                          </p:val>
+                                        </p:tav>
+                                      </p:tavLst>
+                                    </p:anim>
+                                    <p:anim calcmode="lin" valueType="num">
+                                      <p:cBhvr>
+                                        <p:cTn id="32" dur="1000" fill="hold"/>
+                                        <p:tgtEl>
+                                          <p:spTgt spid="1026"/>
+                                        </p:tgtEl>
+                                        <p:attrNameLst>
+                                          <p:attrName>ppt_h</p:attrName>
+                                        </p:attrNameLst>
+                                      </p:cBhvr>
+                                      <p:tavLst>
+                                        <p:tav tm="0">
+                                          <p:val>
+                                            <p:fltVal val="0"/>
+                                          </p:val>
+                                        </p:tav>
+                                        <p:tav tm="100000">
+                                          <p:val>
+                                            <p:strVal val="#ppt_h"/>
+                                          </p:val>
+                                        </p:tav>
+                                      </p:tavLst>
+                                    </p:anim>
+                                    <p:anim calcmode="lin" valueType="num">
+                                      <p:cBhvr>
+                                        <p:cTn id="33" dur="1000" fill="hold"/>
+                                        <p:tgtEl>
+                                          <p:spTgt spid="1026"/>
+                                        </p:tgtEl>
+                                        <p:attrNameLst>
+                                          <p:attrName>ppt_x</p:attrName>
+                                        </p:attrNameLst>
+                                      </p:cBhvr>
+                                      <p:tavLst>
+                                        <p:tav tm="0" fmla="#ppt_x+(cos(-2*pi*(1-$))*-#ppt_x-sin(-2*pi*(1-$))*(1-#ppt_y))*(1-$)">
+                                          <p:val>
+                                            <p:fltVal val="0"/>
+                                          </p:val>
+                                        </p:tav>
+                                        <p:tav tm="100000">
+                                          <p:val>
+                                            <p:fltVal val="1"/>
+                                          </p:val>
+                                        </p:tav>
+                                      </p:tavLst>
+                                    </p:anim>
+                                    <p:anim calcmode="lin" valueType="num">
+                                      <p:cBhvr>
+                                        <p:cTn id="34" dur="1000" fill="hold"/>
+                                        <p:tgtEl>
+                                          <p:spTgt spid="1026"/>
+                                        </p:tgtEl>
+                                        <p:attrNameLst>
+                                          <p:attrName>ppt_y</p:attrName>
+                                        </p:attrNameLst>
+                                      </p:cBhvr>
+                                      <p:tavLst>
+                                        <p:tav tm="0" fmla="#ppt_y+(sin(-2*pi*(1-$))*-#ppt_x+cos(-2*pi*(1-$))*(1-#ppt_y))*(1-$)">
+                                          <p:val>
+                                            <p:fltVal val="0"/>
+                                          </p:val>
+                                        </p:tav>
+                                        <p:tav tm="100000">
+                                          <p:val>
+                                            <p:fltVal val="1"/>
+                                          </p:val>
+                                        </p:tav>
+                                      </p:tavLst>
+                                    </p:anim>
+                                  </p:childTnLst>
+                                </p:cTn>
+                              </p:par>
+                              <p:par>
+                                <p:cTn id="35" presetID="15" presetClass="entr" presetSubtype="0" fill="hold" grpId="0" nodeType="withEffect">
+                                  <p:stCondLst>
+                                    <p:cond delay="0"/>
+                                  </p:stCondLst>
+                                  <p:childTnLst>
+                                    <p:set>
+                                      <p:cBhvr>
+                                        <p:cTn id="36" dur="1" fill="hold">
+                                          <p:stCondLst>
+                                            <p:cond delay="0"/>
+                                          </p:stCondLst>
+                                        </p:cTn>
+                                        <p:tgtEl>
+                                          <p:spTgt spid="3"/>
+                                        </p:tgtEl>
+                                        <p:attrNameLst>
+                                          <p:attrName>style.visibility</p:attrName>
+                                        </p:attrNameLst>
+                                      </p:cBhvr>
+                                      <p:to>
+                                        <p:strVal val="visible"/>
+                                      </p:to>
+                                    </p:set>
+                                    <p:anim calcmode="lin" valueType="num">
+                                      <p:cBhvr>
+                                        <p:cTn id="37" dur="1000" fill="hold"/>
+                                        <p:tgtEl>
+                                          <p:spTgt spid="3"/>
+                                        </p:tgtEl>
+                                        <p:attrNameLst>
+                                          <p:attrName>ppt_w</p:attrName>
+                                        </p:attrNameLst>
+                                      </p:cBhvr>
+                                      <p:tavLst>
+                                        <p:tav tm="0">
+                                          <p:val>
+                                            <p:fltVal val="0"/>
+                                          </p:val>
+                                        </p:tav>
+                                        <p:tav tm="100000">
+                                          <p:val>
+                                            <p:strVal val="#ppt_w"/>
+                                          </p:val>
+                                        </p:tav>
+                                      </p:tavLst>
+                                    </p:anim>
+                                    <p:anim calcmode="lin" valueType="num">
+                                      <p:cBhvr>
+                                        <p:cTn id="38" dur="1000" fill="hold"/>
+                                        <p:tgtEl>
+                                          <p:spTgt spid="3"/>
+                                        </p:tgtEl>
+                                        <p:attrNameLst>
+                                          <p:attrName>ppt_h</p:attrName>
+                                        </p:attrNameLst>
+                                      </p:cBhvr>
+                                      <p:tavLst>
+                                        <p:tav tm="0">
+                                          <p:val>
+                                            <p:fltVal val="0"/>
+                                          </p:val>
+                                        </p:tav>
+                                        <p:tav tm="100000">
+                                          <p:val>
+                                            <p:strVal val="#ppt_h"/>
+                                          </p:val>
+                                        </p:tav>
+                                      </p:tavLst>
+                                    </p:anim>
+                                    <p:anim calcmode="lin" valueType="num">
+                                      <p:cBhvr>
+                                        <p:cTn id="39" dur="1000" fill="hold"/>
+                                        <p:tgtEl>
+                                          <p:spTgt spid="3"/>
+                                        </p:tgtEl>
+                                        <p:attrNameLst>
+                                          <p:attrName>ppt_x</p:attrName>
+                                        </p:attrNameLst>
+                                      </p:cBhvr>
+                                      <p:tavLst>
+                                        <p:tav tm="0" fmla="#ppt_x+(cos(-2*pi*(1-$))*-#ppt_x-sin(-2*pi*(1-$))*(1-#ppt_y))*(1-$)">
+                                          <p:val>
+                                            <p:fltVal val="0"/>
+                                          </p:val>
+                                        </p:tav>
+                                        <p:tav tm="100000">
+                                          <p:val>
+                                            <p:fltVal val="1"/>
+                                          </p:val>
+                                        </p:tav>
+                                      </p:tavLst>
+                                    </p:anim>
+                                    <p:anim calcmode="lin" valueType="num">
+                                      <p:cBhvr>
+                                        <p:cTn id="40" dur="1000" fill="hold"/>
+                                        <p:tgtEl>
+                                          <p:spTgt spid="3"/>
+                                        </p:tgtEl>
+                                        <p:attrNameLst>
+                                          <p:attrName>ppt_y</p:attrName>
+                                        </p:attrNameLst>
+                                      </p:cBhvr>
+                                      <p:tavLst>
+                                        <p:tav tm="0" fmla="#ppt_y+(sin(-2*pi*(1-$))*-#ppt_x+cos(-2*pi*(1-$))*(1-#ppt_y))*(1-$)">
+                                          <p:val>
+                                            <p:fltVal val="0"/>
+                                          </p:val>
+                                        </p:tav>
+                                        <p:tav tm="100000">
+                                          <p:val>
+                                            <p:fltVal val="1"/>
+                                          </p:val>
+                                        </p:tav>
+                                      </p:tavLst>
+                                    </p:anim>
+                                  </p:childTnLst>
+                                </p:cTn>
+                              </p:par>
+                            </p:childTnLst>
+                          </p:cTn>
+                        </p:par>
+                      </p:childTnLst>
+                    </p:cTn>
+                  </p:par>
+                </p:childTnLst>
+              </p:cTn>
+              <p:prevCondLst>
+                <p:cond evt="onPrev" delay="0">
+                  <p:tgtEl>
+                    <p:sldTgt/>
+                  </p:tgtEl>
+                </p:cond>
+              </p:prevCondLst>
+              <p:nextCondLst>
+                <p:cond evt="onNext" delay="0">
+                  <p:tgtEl>
+                    <p:sldTgt/>
+                  </p:tgtEl>
+                </p:cond>
+              </p:nextCondLst>
+            </p:seq>
+          </p:childTnLst>
+        </p:cTn>
+      </p:par>
+    </p:tnLst>
+    <p:bldLst>
+      <p:bldP spid="3" grpId="0"/>
+    </p:bldLst>
+  </p:timing>
 </p:sld>
 </file>
 
@@ -4497,31 +5702,7 @@
           <a:p>
             <a:r>
               <a:rPr lang="nb-NO" dirty="0" smtClean="0"/>
-              <a:t>The </a:t>
-            </a:r>
-            <a:r>
-              <a:rPr lang="nb-NO" dirty="0" smtClean="0"/>
-              <a:t>N</a:t>
-            </a:r>
-            <a:r>
-              <a:rPr lang="nb-NO" dirty="0" smtClean="0"/>
-              <a:t>ext </a:t>
-            </a:r>
-            <a:r>
-              <a:rPr lang="nb-NO" dirty="0" smtClean="0"/>
-              <a:t>T</a:t>
-            </a:r>
-            <a:r>
-              <a:rPr lang="nb-NO" dirty="0" smtClean="0"/>
-              <a:t>wo </a:t>
-            </a:r>
-            <a:r>
-              <a:rPr lang="nb-NO" dirty="0" smtClean="0"/>
-              <a:t>W</a:t>
-            </a:r>
-            <a:r>
-              <a:rPr lang="nb-NO" dirty="0" smtClean="0"/>
-              <a:t>eeks</a:t>
+              <a:t>The Next Two Weeks</a:t>
             </a:r>
             <a:endParaRPr lang="nb-NO" dirty="0"/>
           </a:p>
@@ -4545,7 +5726,7 @@
         </p:spPr>
         <p:txBody>
           <a:bodyPr>
-            <a:normAutofit fontScale="92500" lnSpcReduction="10000"/>
+            <a:normAutofit lnSpcReduction="10000"/>
           </a:bodyPr>
           <a:lstStyle/>
           <a:p>
@@ -4566,7 +5747,15 @@
           <a:p>
             <a:r>
               <a:rPr lang="en-US" dirty="0" smtClean="0"/>
-              <a:t>R-script more or less sorted out</a:t>
+              <a:t>Finalize R</a:t>
+            </a:r>
+            <a:r>
+              <a:rPr lang="en-US" dirty="0" smtClean="0"/>
+              <a:t>-</a:t>
+            </a:r>
+            <a:r>
+              <a:rPr lang="en-US" dirty="0" smtClean="0"/>
+              <a:t>script</a:t>
             </a:r>
           </a:p>
           <a:p>
@@ -4609,10 +5798,15 @@
             <p:ph sz="half" idx="2"/>
           </p:nvPr>
         </p:nvSpPr>
-        <p:spPr/>
+        <p:spPr>
+          <a:xfrm>
+            <a:off x="4648200" y="1600200"/>
+            <a:ext cx="4038600" cy="4997548"/>
+          </a:xfrm>
+        </p:spPr>
         <p:txBody>
           <a:bodyPr>
-            <a:normAutofit fontScale="92500" lnSpcReduction="10000"/>
+            <a:normAutofit lnSpcReduction="10000"/>
           </a:bodyPr>
           <a:lstStyle/>
           <a:p>
@@ -4637,9 +5831,9 @@
             </a:r>
           </a:p>
           <a:p>
-            <a:endParaRPr lang="en-US" dirty="0" smtClean="0"/>
-          </a:p>
-          <a:p>
+            <a:pPr marL="0" indent="0">
+              <a:buNone/>
+            </a:pPr>
             <a:endParaRPr lang="en-US" dirty="0" smtClean="0"/>
           </a:p>
           <a:p>
@@ -4649,6 +5843,16 @@
             </a:r>
           </a:p>
           <a:p>
+            <a:pPr marL="0" indent="0">
+              <a:buNone/>
+            </a:pPr>
+            <a:r>
+              <a:rPr lang="en-US" dirty="0" smtClean="0"/>
+              <a:t/>
+            </a:r>
+            <a:br>
+              <a:rPr lang="en-US" dirty="0" smtClean="0"/>
+            </a:br>
             <a:endParaRPr lang="en-US" dirty="0" smtClean="0"/>
           </a:p>
           <a:p>
@@ -4698,13 +5902,386 @@
     </p:spTree>
     <p:extLst>
       <p:ext uri="{BB962C8B-B14F-4D97-AF65-F5344CB8AC3E}">
-        <p14:creationId xmlns:p14="http://schemas.microsoft.com/office/powerpoint/2010/main" xmlns="" val="1938490422"/>
+        <p14:creationId xmlns:p14="http://schemas.microsoft.com/office/powerpoint/2010/main" val="1938490422"/>
       </p:ext>
     </p:extLst>
   </p:cSld>
   <p:clrMapOvr>
     <a:masterClrMapping/>
   </p:clrMapOvr>
+  <p:timing>
+    <p:tnLst>
+      <p:par>
+        <p:cTn xmlns:p14="http://schemas.microsoft.com/office/powerpoint/2010/main" id="1" dur="indefinite" restart="never" nodeType="tmRoot">
+          <p:childTnLst>
+            <p:seq concurrent="1" nextAc="seek">
+              <p:cTn id="2" dur="indefinite" nodeType="mainSeq">
+                <p:childTnLst>
+                  <p:par>
+                    <p:cTn id="3" fill="hold">
+                      <p:stCondLst>
+                        <p:cond delay="indefinite"/>
+                      </p:stCondLst>
+                      <p:childTnLst>
+                        <p:par>
+                          <p:cTn id="4" fill="hold">
+                            <p:stCondLst>
+                              <p:cond delay="0"/>
+                            </p:stCondLst>
+                            <p:childTnLst>
+                              <p:par>
+                                <p:cTn id="5" presetID="1" presetClass="entr" presetSubtype="0" fill="hold" nodeType="clickEffect">
+                                  <p:stCondLst>
+                                    <p:cond delay="0"/>
+                                  </p:stCondLst>
+                                  <p:childTnLst>
+                                    <p:set>
+                                      <p:cBhvr>
+                                        <p:cTn id="6" dur="1" fill="hold">
+                                          <p:stCondLst>
+                                            <p:cond delay="0"/>
+                                          </p:stCondLst>
+                                        </p:cTn>
+                                        <p:tgtEl>
+                                          <p:spTgt spid="3">
+                                            <p:txEl>
+                                              <p:pRg st="2" end="2"/>
+                                            </p:txEl>
+                                          </p:spTgt>
+                                        </p:tgtEl>
+                                        <p:attrNameLst>
+                                          <p:attrName>style.visibility</p:attrName>
+                                        </p:attrNameLst>
+                                      </p:cBhvr>
+                                      <p:to>
+                                        <p:strVal val="visible"/>
+                                      </p:to>
+                                    </p:set>
+                                  </p:childTnLst>
+                                </p:cTn>
+                              </p:par>
+                            </p:childTnLst>
+                          </p:cTn>
+                        </p:par>
+                      </p:childTnLst>
+                    </p:cTn>
+                  </p:par>
+                  <p:par>
+                    <p:cTn id="7" fill="hold">
+                      <p:stCondLst>
+                        <p:cond delay="indefinite"/>
+                      </p:stCondLst>
+                      <p:childTnLst>
+                        <p:par>
+                          <p:cTn id="8" fill="hold">
+                            <p:stCondLst>
+                              <p:cond delay="0"/>
+                            </p:stCondLst>
+                            <p:childTnLst>
+                              <p:par>
+                                <p:cTn id="9" presetID="1" presetClass="entr" presetSubtype="0" fill="hold" nodeType="clickEffect">
+                                  <p:stCondLst>
+                                    <p:cond delay="0"/>
+                                  </p:stCondLst>
+                                  <p:childTnLst>
+                                    <p:set>
+                                      <p:cBhvr>
+                                        <p:cTn id="10" dur="1" fill="hold">
+                                          <p:stCondLst>
+                                            <p:cond delay="0"/>
+                                          </p:stCondLst>
+                                        </p:cTn>
+                                        <p:tgtEl>
+                                          <p:spTgt spid="3">
+                                            <p:txEl>
+                                              <p:pRg st="4" end="4"/>
+                                            </p:txEl>
+                                          </p:spTgt>
+                                        </p:tgtEl>
+                                        <p:attrNameLst>
+                                          <p:attrName>style.visibility</p:attrName>
+                                        </p:attrNameLst>
+                                      </p:cBhvr>
+                                      <p:to>
+                                        <p:strVal val="visible"/>
+                                      </p:to>
+                                    </p:set>
+                                  </p:childTnLst>
+                                </p:cTn>
+                              </p:par>
+                            </p:childTnLst>
+                          </p:cTn>
+                        </p:par>
+                      </p:childTnLst>
+                    </p:cTn>
+                  </p:par>
+                  <p:par>
+                    <p:cTn id="11" fill="hold">
+                      <p:stCondLst>
+                        <p:cond delay="indefinite"/>
+                      </p:stCondLst>
+                      <p:childTnLst>
+                        <p:par>
+                          <p:cTn id="12" fill="hold">
+                            <p:stCondLst>
+                              <p:cond delay="0"/>
+                            </p:stCondLst>
+                            <p:childTnLst>
+                              <p:par>
+                                <p:cTn id="13" presetID="1" presetClass="entr" presetSubtype="0" fill="hold" nodeType="clickEffect">
+                                  <p:stCondLst>
+                                    <p:cond delay="0"/>
+                                  </p:stCondLst>
+                                  <p:childTnLst>
+                                    <p:set>
+                                      <p:cBhvr>
+                                        <p:cTn id="14" dur="1" fill="hold">
+                                          <p:stCondLst>
+                                            <p:cond delay="0"/>
+                                          </p:stCondLst>
+                                        </p:cTn>
+                                        <p:tgtEl>
+                                          <p:spTgt spid="3">
+                                            <p:txEl>
+                                              <p:pRg st="6" end="6"/>
+                                            </p:txEl>
+                                          </p:spTgt>
+                                        </p:tgtEl>
+                                        <p:attrNameLst>
+                                          <p:attrName>style.visibility</p:attrName>
+                                        </p:attrNameLst>
+                                      </p:cBhvr>
+                                      <p:to>
+                                        <p:strVal val="visible"/>
+                                      </p:to>
+                                    </p:set>
+                                  </p:childTnLst>
+                                </p:cTn>
+                              </p:par>
+                            </p:childTnLst>
+                          </p:cTn>
+                        </p:par>
+                      </p:childTnLst>
+                    </p:cTn>
+                  </p:par>
+                  <p:par>
+                    <p:cTn id="15" fill="hold">
+                      <p:stCondLst>
+                        <p:cond delay="indefinite"/>
+                      </p:stCondLst>
+                      <p:childTnLst>
+                        <p:par>
+                          <p:cTn id="16" fill="hold">
+                            <p:stCondLst>
+                              <p:cond delay="0"/>
+                            </p:stCondLst>
+                            <p:childTnLst>
+                              <p:par>
+                                <p:cTn id="17" presetID="1" presetClass="entr" presetSubtype="0" fill="hold" nodeType="clickEffect">
+                                  <p:stCondLst>
+                                    <p:cond delay="0"/>
+                                  </p:stCondLst>
+                                  <p:childTnLst>
+                                    <p:set>
+                                      <p:cBhvr>
+                                        <p:cTn id="18" dur="1" fill="hold">
+                                          <p:stCondLst>
+                                            <p:cond delay="0"/>
+                                          </p:stCondLst>
+                                        </p:cTn>
+                                        <p:tgtEl>
+                                          <p:spTgt spid="4">
+                                            <p:txEl>
+                                              <p:pRg st="0" end="0"/>
+                                            </p:txEl>
+                                          </p:spTgt>
+                                        </p:tgtEl>
+                                        <p:attrNameLst>
+                                          <p:attrName>style.visibility</p:attrName>
+                                        </p:attrNameLst>
+                                      </p:cBhvr>
+                                      <p:to>
+                                        <p:strVal val="visible"/>
+                                      </p:to>
+                                    </p:set>
+                                  </p:childTnLst>
+                                </p:cTn>
+                              </p:par>
+                            </p:childTnLst>
+                          </p:cTn>
+                        </p:par>
+                      </p:childTnLst>
+                    </p:cTn>
+                  </p:par>
+                  <p:par>
+                    <p:cTn id="19" fill="hold">
+                      <p:stCondLst>
+                        <p:cond delay="indefinite"/>
+                      </p:stCondLst>
+                      <p:childTnLst>
+                        <p:par>
+                          <p:cTn id="20" fill="hold">
+                            <p:stCondLst>
+                              <p:cond delay="0"/>
+                            </p:stCondLst>
+                            <p:childTnLst>
+                              <p:par>
+                                <p:cTn id="21" presetID="1" presetClass="entr" presetSubtype="0" fill="hold" nodeType="clickEffect">
+                                  <p:stCondLst>
+                                    <p:cond delay="0"/>
+                                  </p:stCondLst>
+                                  <p:childTnLst>
+                                    <p:set>
+                                      <p:cBhvr>
+                                        <p:cTn id="22" dur="1" fill="hold">
+                                          <p:stCondLst>
+                                            <p:cond delay="0"/>
+                                          </p:stCondLst>
+                                        </p:cTn>
+                                        <p:tgtEl>
+                                          <p:spTgt spid="4">
+                                            <p:txEl>
+                                              <p:pRg st="2" end="2"/>
+                                            </p:txEl>
+                                          </p:spTgt>
+                                        </p:tgtEl>
+                                        <p:attrNameLst>
+                                          <p:attrName>style.visibility</p:attrName>
+                                        </p:attrNameLst>
+                                      </p:cBhvr>
+                                      <p:to>
+                                        <p:strVal val="visible"/>
+                                      </p:to>
+                                    </p:set>
+                                  </p:childTnLst>
+                                </p:cTn>
+                              </p:par>
+                            </p:childTnLst>
+                          </p:cTn>
+                        </p:par>
+                      </p:childTnLst>
+                    </p:cTn>
+                  </p:par>
+                  <p:par>
+                    <p:cTn id="23" fill="hold">
+                      <p:stCondLst>
+                        <p:cond delay="indefinite"/>
+                      </p:stCondLst>
+                      <p:childTnLst>
+                        <p:par>
+                          <p:cTn id="24" fill="hold">
+                            <p:stCondLst>
+                              <p:cond delay="0"/>
+                            </p:stCondLst>
+                            <p:childTnLst>
+                              <p:par>
+                                <p:cTn id="25" presetID="1" presetClass="entr" presetSubtype="0" fill="hold" nodeType="clickEffect">
+                                  <p:stCondLst>
+                                    <p:cond delay="0"/>
+                                  </p:stCondLst>
+                                  <p:childTnLst>
+                                    <p:set>
+                                      <p:cBhvr>
+                                        <p:cTn id="26" dur="1" fill="hold">
+                                          <p:stCondLst>
+                                            <p:cond delay="0"/>
+                                          </p:stCondLst>
+                                        </p:cTn>
+                                        <p:tgtEl>
+                                          <p:spTgt spid="4">
+                                            <p:txEl>
+                                              <p:pRg st="4" end="4"/>
+                                            </p:txEl>
+                                          </p:spTgt>
+                                        </p:tgtEl>
+                                        <p:attrNameLst>
+                                          <p:attrName>style.visibility</p:attrName>
+                                        </p:attrNameLst>
+                                      </p:cBhvr>
+                                      <p:to>
+                                        <p:strVal val="visible"/>
+                                      </p:to>
+                                    </p:set>
+                                  </p:childTnLst>
+                                </p:cTn>
+                              </p:par>
+                            </p:childTnLst>
+                          </p:cTn>
+                        </p:par>
+                      </p:childTnLst>
+                    </p:cTn>
+                  </p:par>
+                  <p:par>
+                    <p:cTn id="27" fill="hold">
+                      <p:stCondLst>
+                        <p:cond delay="indefinite"/>
+                      </p:stCondLst>
+                      <p:childTnLst>
+                        <p:par>
+                          <p:cTn id="28" fill="hold">
+                            <p:stCondLst>
+                              <p:cond delay="0"/>
+                            </p:stCondLst>
+                            <p:childTnLst>
+                              <p:par>
+                                <p:cTn id="29" presetID="1" presetClass="entr" presetSubtype="0" fill="hold" nodeType="clickEffect">
+                                  <p:stCondLst>
+                                    <p:cond delay="0"/>
+                                  </p:stCondLst>
+                                  <p:childTnLst>
+                                    <p:set>
+                                      <p:cBhvr>
+                                        <p:cTn id="30" dur="1" fill="hold">
+                                          <p:stCondLst>
+                                            <p:cond delay="0"/>
+                                          </p:stCondLst>
+                                        </p:cTn>
+                                        <p:tgtEl>
+                                          <p:spTgt spid="4">
+                                            <p:txEl>
+                                              <p:pRg st="6" end="6"/>
+                                            </p:txEl>
+                                          </p:spTgt>
+                                        </p:tgtEl>
+                                        <p:attrNameLst>
+                                          <p:attrName>style.visibility</p:attrName>
+                                        </p:attrNameLst>
+                                      </p:cBhvr>
+                                      <p:to>
+                                        <p:strVal val="visible"/>
+                                      </p:to>
+                                    </p:set>
+                                  </p:childTnLst>
+                                </p:cTn>
+                              </p:par>
+                            </p:childTnLst>
+                          </p:cTn>
+                        </p:par>
+                      </p:childTnLst>
+                    </p:cTn>
+                  </p:par>
+                </p:childTnLst>
+              </p:cTn>
+              <p:prevCondLst>
+                <p:cond evt="onPrev" delay="0">
+                  <p:tgtEl>
+                    <p:sldTgt/>
+                  </p:tgtEl>
+                </p:cond>
+              </p:prevCondLst>
+              <p:nextCondLst>
+                <p:cond evt="onNext" delay="0">
+                  <p:tgtEl>
+                    <p:sldTgt/>
+                  </p:tgtEl>
+                </p:cond>
+              </p:nextCondLst>
+            </p:seq>
+          </p:childTnLst>
+        </p:cTn>
+      </p:par>
+    </p:tnLst>
+  </p:timing>
 </p:sld>
 </file>
 

</xml_diff>

<commit_message>
changed a few minor things in headings
</commit_message>
<xml_diff>
--- a/Presentation/Presentation nov 18.pptx
+++ b/Presentation/Presentation nov 18.pptx
@@ -196,7 +196,8 @@
           <a:p>
             <a:fld id="{9184657C-6B7B-4D11-92FE-19D7F27F78B9}" type="datetimeFigureOut">
               <a:rPr lang="en-GB" smtClean="0"/>
-              <a:t>17.11.14</a:t>
+              <a:pPr/>
+              <a:t>17/11/2014</a:t>
             </a:fld>
             <a:endParaRPr lang="en-GB"/>
           </a:p>
@@ -357,7 +358,8 @@
           <a:p>
             <a:fld id="{1E047F9F-E4D1-4A29-BB8A-19035468A4E4}" type="slidenum">
               <a:rPr lang="en-GB" smtClean="0"/>
-              <a:t>‹#›</a:t>
+              <a:pPr/>
+              <a:t>‹Nº›</a:t>
             </a:fld>
             <a:endParaRPr lang="en-GB"/>
           </a:p>
@@ -366,7 +368,7 @@
     </p:spTree>
     <p:extLst>
       <p:ext uri="{BB962C8B-B14F-4D97-AF65-F5344CB8AC3E}">
-        <p14:creationId xmlns:p14="http://schemas.microsoft.com/office/powerpoint/2010/main" val="2624709471"/>
+        <p14:creationId xmlns:p14="http://schemas.microsoft.com/office/powerpoint/2010/main" xmlns="" val="2624709471"/>
       </p:ext>
     </p:extLst>
   </p:cSld>
@@ -533,6 +535,7 @@
           <a:p>
             <a:fld id="{1E047F9F-E4D1-4A29-BB8A-19035468A4E4}" type="slidenum">
               <a:rPr lang="en-GB" smtClean="0"/>
+              <a:pPr/>
               <a:t>2</a:t>
             </a:fld>
             <a:endParaRPr lang="en-GB"/>
@@ -729,7 +732,7 @@
             <a:fld id="{89ABF61E-C81E-B147-A9C3-9359CCDF05AF}" type="datetimeFigureOut">
               <a:rPr lang="nb-NO" smtClean="0"/>
               <a:pPr/>
-              <a:t>17.11.14</a:t>
+              <a:t>17.11.2014</a:t>
             </a:fld>
             <a:endParaRPr lang="nb-NO"/>
           </a:p>
@@ -772,7 +775,7 @@
             <a:fld id="{A592D690-0A75-2B47-B762-A5B99D01306A}" type="slidenum">
               <a:rPr lang="nb-NO" smtClean="0"/>
               <a:pPr/>
-              <a:t>‹#›</a:t>
+              <a:t>‹Nº›</a:t>
             </a:fld>
             <a:endParaRPr lang="nb-NO"/>
           </a:p>
@@ -896,7 +899,7 @@
             <a:fld id="{89ABF61E-C81E-B147-A9C3-9359CCDF05AF}" type="datetimeFigureOut">
               <a:rPr lang="nb-NO" smtClean="0"/>
               <a:pPr/>
-              <a:t>17.11.14</a:t>
+              <a:t>17.11.2014</a:t>
             </a:fld>
             <a:endParaRPr lang="nb-NO"/>
           </a:p>
@@ -939,7 +942,7 @@
             <a:fld id="{A592D690-0A75-2B47-B762-A5B99D01306A}" type="slidenum">
               <a:rPr lang="nb-NO" smtClean="0"/>
               <a:pPr/>
-              <a:t>‹#›</a:t>
+              <a:t>‹Nº›</a:t>
             </a:fld>
             <a:endParaRPr lang="nb-NO"/>
           </a:p>
@@ -1073,7 +1076,7 @@
             <a:fld id="{89ABF61E-C81E-B147-A9C3-9359CCDF05AF}" type="datetimeFigureOut">
               <a:rPr lang="nb-NO" smtClean="0"/>
               <a:pPr/>
-              <a:t>17.11.14</a:t>
+              <a:t>17.11.2014</a:t>
             </a:fld>
             <a:endParaRPr lang="nb-NO"/>
           </a:p>
@@ -1116,7 +1119,7 @@
             <a:fld id="{A592D690-0A75-2B47-B762-A5B99D01306A}" type="slidenum">
               <a:rPr lang="nb-NO" smtClean="0"/>
               <a:pPr/>
-              <a:t>‹#›</a:t>
+              <a:t>‹Nº›</a:t>
             </a:fld>
             <a:endParaRPr lang="nb-NO"/>
           </a:p>
@@ -1240,7 +1243,7 @@
             <a:fld id="{89ABF61E-C81E-B147-A9C3-9359CCDF05AF}" type="datetimeFigureOut">
               <a:rPr lang="nb-NO" smtClean="0"/>
               <a:pPr/>
-              <a:t>17.11.14</a:t>
+              <a:t>17.11.2014</a:t>
             </a:fld>
             <a:endParaRPr lang="nb-NO"/>
           </a:p>
@@ -1283,7 +1286,7 @@
             <a:fld id="{A592D690-0A75-2B47-B762-A5B99D01306A}" type="slidenum">
               <a:rPr lang="nb-NO" smtClean="0"/>
               <a:pPr/>
-              <a:t>‹#›</a:t>
+              <a:t>‹Nº›</a:t>
             </a:fld>
             <a:endParaRPr lang="nb-NO"/>
           </a:p>
@@ -1483,7 +1486,7 @@
             <a:fld id="{89ABF61E-C81E-B147-A9C3-9359CCDF05AF}" type="datetimeFigureOut">
               <a:rPr lang="nb-NO" smtClean="0"/>
               <a:pPr/>
-              <a:t>17.11.14</a:t>
+              <a:t>17.11.2014</a:t>
             </a:fld>
             <a:endParaRPr lang="nb-NO"/>
           </a:p>
@@ -1526,7 +1529,7 @@
             <a:fld id="{A592D690-0A75-2B47-B762-A5B99D01306A}" type="slidenum">
               <a:rPr lang="nb-NO" smtClean="0"/>
               <a:pPr/>
-              <a:t>‹#›</a:t>
+              <a:t>‹Nº›</a:t>
             </a:fld>
             <a:endParaRPr lang="nb-NO"/>
           </a:p>
@@ -1768,7 +1771,7 @@
             <a:fld id="{89ABF61E-C81E-B147-A9C3-9359CCDF05AF}" type="datetimeFigureOut">
               <a:rPr lang="nb-NO" smtClean="0"/>
               <a:pPr/>
-              <a:t>17.11.14</a:t>
+              <a:t>17.11.2014</a:t>
             </a:fld>
             <a:endParaRPr lang="nb-NO"/>
           </a:p>
@@ -1811,7 +1814,7 @@
             <a:fld id="{A592D690-0A75-2B47-B762-A5B99D01306A}" type="slidenum">
               <a:rPr lang="nb-NO" smtClean="0"/>
               <a:pPr/>
-              <a:t>‹#›</a:t>
+              <a:t>‹Nº›</a:t>
             </a:fld>
             <a:endParaRPr lang="nb-NO"/>
           </a:p>
@@ -2187,7 +2190,7 @@
             <a:fld id="{89ABF61E-C81E-B147-A9C3-9359CCDF05AF}" type="datetimeFigureOut">
               <a:rPr lang="nb-NO" smtClean="0"/>
               <a:pPr/>
-              <a:t>17.11.14</a:t>
+              <a:t>17.11.2014</a:t>
             </a:fld>
             <a:endParaRPr lang="nb-NO"/>
           </a:p>
@@ -2230,7 +2233,7 @@
             <a:fld id="{A592D690-0A75-2B47-B762-A5B99D01306A}" type="slidenum">
               <a:rPr lang="nb-NO" smtClean="0"/>
               <a:pPr/>
-              <a:t>‹#›</a:t>
+              <a:t>‹Nº›</a:t>
             </a:fld>
             <a:endParaRPr lang="nb-NO"/>
           </a:p>
@@ -2302,7 +2305,7 @@
             <a:fld id="{89ABF61E-C81E-B147-A9C3-9359CCDF05AF}" type="datetimeFigureOut">
               <a:rPr lang="nb-NO" smtClean="0"/>
               <a:pPr/>
-              <a:t>17.11.14</a:t>
+              <a:t>17.11.2014</a:t>
             </a:fld>
             <a:endParaRPr lang="nb-NO"/>
           </a:p>
@@ -2345,7 +2348,7 @@
             <a:fld id="{A592D690-0A75-2B47-B762-A5B99D01306A}" type="slidenum">
               <a:rPr lang="nb-NO" smtClean="0"/>
               <a:pPr/>
-              <a:t>‹#›</a:t>
+              <a:t>‹Nº›</a:t>
             </a:fld>
             <a:endParaRPr lang="nb-NO"/>
           </a:p>
@@ -2394,7 +2397,7 @@
             <a:fld id="{89ABF61E-C81E-B147-A9C3-9359CCDF05AF}" type="datetimeFigureOut">
               <a:rPr lang="nb-NO" smtClean="0"/>
               <a:pPr/>
-              <a:t>17.11.14</a:t>
+              <a:t>17.11.2014</a:t>
             </a:fld>
             <a:endParaRPr lang="nb-NO"/>
           </a:p>
@@ -2437,7 +2440,7 @@
             <a:fld id="{A592D690-0A75-2B47-B762-A5B99D01306A}" type="slidenum">
               <a:rPr lang="nb-NO" smtClean="0"/>
               <a:pPr/>
-              <a:t>‹#›</a:t>
+              <a:t>‹Nº›</a:t>
             </a:fld>
             <a:endParaRPr lang="nb-NO"/>
           </a:p>
@@ -2668,7 +2671,7 @@
             <a:fld id="{89ABF61E-C81E-B147-A9C3-9359CCDF05AF}" type="datetimeFigureOut">
               <a:rPr lang="nb-NO" smtClean="0"/>
               <a:pPr/>
-              <a:t>17.11.14</a:t>
+              <a:t>17.11.2014</a:t>
             </a:fld>
             <a:endParaRPr lang="nb-NO"/>
           </a:p>
@@ -2711,7 +2714,7 @@
             <a:fld id="{A592D690-0A75-2B47-B762-A5B99D01306A}" type="slidenum">
               <a:rPr lang="nb-NO" smtClean="0"/>
               <a:pPr/>
-              <a:t>‹#›</a:t>
+              <a:t>‹Nº›</a:t>
             </a:fld>
             <a:endParaRPr lang="nb-NO"/>
           </a:p>
@@ -2918,7 +2921,7 @@
             <a:fld id="{89ABF61E-C81E-B147-A9C3-9359CCDF05AF}" type="datetimeFigureOut">
               <a:rPr lang="nb-NO" smtClean="0"/>
               <a:pPr/>
-              <a:t>17.11.14</a:t>
+              <a:t>17.11.2014</a:t>
             </a:fld>
             <a:endParaRPr lang="nb-NO"/>
           </a:p>
@@ -2961,7 +2964,7 @@
             <a:fld id="{A592D690-0A75-2B47-B762-A5B99D01306A}" type="slidenum">
               <a:rPr lang="nb-NO" smtClean="0"/>
               <a:pPr/>
-              <a:t>‹#›</a:t>
+              <a:t>‹Nº›</a:t>
             </a:fld>
             <a:endParaRPr lang="nb-NO"/>
           </a:p>
@@ -3128,7 +3131,7 @@
             <a:fld id="{89ABF61E-C81E-B147-A9C3-9359CCDF05AF}" type="datetimeFigureOut">
               <a:rPr lang="nb-NO" smtClean="0"/>
               <a:pPr/>
-              <a:t>17.11.14</a:t>
+              <a:t>17.11.2014</a:t>
             </a:fld>
             <a:endParaRPr lang="nb-NO"/>
           </a:p>
@@ -3207,7 +3210,7 @@
             <a:fld id="{A592D690-0A75-2B47-B762-A5B99D01306A}" type="slidenum">
               <a:rPr lang="nb-NO" smtClean="0"/>
               <a:pPr/>
-              <a:t>‹#›</a:t>
+              <a:t>‹Nº›</a:t>
             </a:fld>
             <a:endParaRPr lang="nb-NO"/>
           </a:p>
@@ -3549,7 +3552,22 @@
                   <a:srgbClr val="00B050"/>
                 </a:solidFill>
               </a:rPr>
-              <a:t> Meta-</a:t>
+              <a:t> of a </a:t>
+            </a:r>
+            <a:br>
+              <a:rPr lang="es-ES_tradnl" dirty="0" smtClean="0">
+                <a:solidFill>
+                  <a:srgbClr val="00B050"/>
+                </a:solidFill>
+              </a:rPr>
+            </a:br>
+            <a:r>
+              <a:rPr lang="es-ES_tradnl" dirty="0" smtClean="0">
+                <a:solidFill>
+                  <a:srgbClr val="00B050"/>
+                </a:solidFill>
+              </a:rPr>
+              <a:t>Meta-</a:t>
             </a:r>
             <a:r>
               <a:rPr lang="es-ES_tradnl" dirty="0" err="1" smtClean="0">
@@ -3648,7 +3666,7 @@
   <p:timing>
     <p:tnLst>
       <p:par>
-        <p:cTn xmlns:p14="http://schemas.microsoft.com/office/powerpoint/2010/main" id="1" dur="indefinite" restart="never" nodeType="tmRoot"/>
+        <p:cTn id="1" dur="indefinite" restart="never" nodeType="tmRoot"/>
       </p:par>
     </p:tnLst>
   </p:timing>
@@ -3940,7 +3958,7 @@
     </p:spTree>
     <p:extLst>
       <p:ext uri="{BB962C8B-B14F-4D97-AF65-F5344CB8AC3E}">
-        <p14:creationId xmlns:p14="http://schemas.microsoft.com/office/powerpoint/2010/main" val="2734221090"/>
+        <p14:creationId xmlns:p14="http://schemas.microsoft.com/office/powerpoint/2010/main" xmlns="" val="2734221090"/>
       </p:ext>
     </p:extLst>
   </p:cSld>
@@ -3950,7 +3968,7 @@
   <p:timing>
     <p:tnLst>
       <p:par>
-        <p:cTn xmlns:p14="http://schemas.microsoft.com/office/powerpoint/2010/main" id="1" dur="indefinite" restart="never" nodeType="tmRoot">
+        <p:cTn id="1" dur="indefinite" restart="never" nodeType="tmRoot">
           <p:childTnLst>
             <p:seq concurrent="1" nextAc="seek">
               <p:cTn id="2" dur="indefinite" nodeType="mainSeq">
@@ -4398,11 +4416,7 @@
             </a:r>
             <a:r>
               <a:rPr lang="en-US" dirty="0" smtClean="0"/>
-              <a:t> </a:t>
-            </a:r>
-            <a:r>
-              <a:rPr lang="en-US" dirty="0" smtClean="0"/>
-              <a:t>function (in </a:t>
+              <a:t> function (in </a:t>
             </a:r>
             <a:r>
               <a:rPr lang="en-US" dirty="0" err="1" smtClean="0">
@@ -4415,7 +4429,6 @@
               <a:rPr lang="en-US" dirty="0" smtClean="0"/>
               <a:t> package) </a:t>
             </a:r>
-            <a:endParaRPr lang="en-US" dirty="0" smtClean="0"/>
           </a:p>
           <a:p>
             <a:pPr marL="914400" lvl="1" indent="-514350"/>
@@ -4435,7 +4448,19 @@
             <a:pPr marL="914400" lvl="1" indent="-514350"/>
             <a:r>
               <a:rPr lang="en-US" dirty="0" smtClean="0"/>
-              <a:t>Adding moderators in </a:t>
+              <a:t>Adding </a:t>
+            </a:r>
+            <a:r>
+              <a:rPr lang="en-US" smtClean="0"/>
+              <a:t>moderators </a:t>
+            </a:r>
+            <a:r>
+              <a:rPr lang="en-US" smtClean="0"/>
+              <a:t>to</a:t>
+            </a:r>
+            <a:r>
+              <a:rPr lang="en-US" smtClean="0"/>
+              <a:t> </a:t>
             </a:r>
             <a:r>
               <a:rPr lang="en-US" dirty="0" err="1" smtClean="0">
@@ -4448,17 +4473,8 @@
               <a:rPr lang="en-US" dirty="0" smtClean="0">
                 <a:cs typeface="Lucida Console"/>
               </a:rPr>
-              <a:t> function (meta regression</a:t>
-            </a:r>
-            <a:r>
-              <a:rPr lang="en-US" dirty="0" smtClean="0">
-                <a:cs typeface="Lucida Console"/>
-              </a:rPr>
-              <a:t>)</a:t>
-            </a:r>
-            <a:endParaRPr lang="en-US" dirty="0" smtClean="0">
-              <a:cs typeface="Lucida Console"/>
-            </a:endParaRPr>
+              <a:t> function (meta regression)</a:t>
+            </a:r>
           </a:p>
           <a:p>
             <a:pPr marL="914400" lvl="1" indent="-514350"/>
@@ -4485,7 +4501,25 @@
             </a:r>
             <a:r>
               <a:rPr lang="en-US" dirty="0" smtClean="0"/>
-              <a:t> plot, Fail-Safe N analysis</a:t>
+              <a:t> plot, </a:t>
+            </a:r>
+            <a:r>
+              <a:rPr lang="en-US" dirty="0" smtClean="0"/>
+              <a:t> </a:t>
+            </a:r>
+            <a:r>
+              <a:rPr lang="en-US" dirty="0" smtClean="0">
+                <a:latin typeface="Lucida Console" pitchFamily="49" charset="0"/>
+              </a:rPr>
+              <a:t>Fail-Safe N</a:t>
+            </a:r>
+            <a:r>
+              <a:rPr lang="en-US" dirty="0" smtClean="0"/>
+              <a:t> </a:t>
+            </a:r>
+            <a:r>
+              <a:rPr lang="en-US" dirty="0" smtClean="0"/>
+              <a:t>analysis</a:t>
             </a:r>
           </a:p>
           <a:p>
@@ -4513,8 +4547,13 @@
             </a:r>
             <a:r>
               <a:rPr lang="en-US" dirty="0" smtClean="0"/>
-              <a:t> analysis</a:t>
-            </a:r>
+              <a:t> </a:t>
+            </a:r>
+            <a:r>
+              <a:rPr lang="en-US" dirty="0" smtClean="0"/>
+              <a:t>function and analysis</a:t>
+            </a:r>
+            <a:endParaRPr lang="en-US" dirty="0" smtClean="0"/>
           </a:p>
         </p:txBody>
       </p:sp>
@@ -4556,7 +4595,7 @@
     </p:spTree>
     <p:extLst>
       <p:ext uri="{BB962C8B-B14F-4D97-AF65-F5344CB8AC3E}">
-        <p14:creationId xmlns:p14="http://schemas.microsoft.com/office/powerpoint/2010/main" val="4148343161"/>
+        <p14:creationId xmlns:p14="http://schemas.microsoft.com/office/powerpoint/2010/main" xmlns="" val="4148343161"/>
       </p:ext>
     </p:extLst>
   </p:cSld>
@@ -4566,7 +4605,7 @@
   <p:timing>
     <p:tnLst>
       <p:par>
-        <p:cTn xmlns:p14="http://schemas.microsoft.com/office/powerpoint/2010/main" id="1" dur="indefinite" restart="never" nodeType="tmRoot">
+        <p:cTn id="1" dur="indefinite" restart="never" nodeType="tmRoot">
           <p:childTnLst>
             <p:seq concurrent="1" nextAc="seek">
               <p:cTn id="2" dur="indefinite" nodeType="mainSeq">
@@ -4958,13 +4997,8 @@
             </a:pPr>
             <a:r>
               <a:rPr lang="en-US" sz="1850" dirty="0" smtClean="0"/>
-              <a:t>And voila! Here’s our result</a:t>
-            </a:r>
-            <a:r>
-              <a:rPr lang="en-US" sz="1850" dirty="0" smtClean="0"/>
-              <a:t>!</a:t>
-            </a:r>
-            <a:endParaRPr lang="en-US" sz="1850" dirty="0" smtClean="0"/>
+              <a:t>And voila! Here’s our result!</a:t>
+            </a:r>
           </a:p>
         </p:txBody>
       </p:sp>
@@ -5075,7 +5109,7 @@
     </p:spTree>
     <p:extLst>
       <p:ext uri="{BB962C8B-B14F-4D97-AF65-F5344CB8AC3E}">
-        <p14:creationId xmlns:p14="http://schemas.microsoft.com/office/powerpoint/2010/main" val="756268187"/>
+        <p14:creationId xmlns:p14="http://schemas.microsoft.com/office/powerpoint/2010/main" xmlns="" val="756268187"/>
       </p:ext>
     </p:extLst>
   </p:cSld>
@@ -5085,7 +5119,7 @@
   <p:timing>
     <p:tnLst>
       <p:par>
-        <p:cTn xmlns:p14="http://schemas.microsoft.com/office/powerpoint/2010/main" id="1" dur="indefinite" restart="never" nodeType="tmRoot">
+        <p:cTn id="1" dur="indefinite" restart="never" nodeType="tmRoot">
           <p:childTnLst>
             <p:seq concurrent="1" nextAc="seek">
               <p:cTn id="2" dur="indefinite" nodeType="mainSeq">
@@ -5747,15 +5781,7 @@
           <a:p>
             <a:r>
               <a:rPr lang="en-US" dirty="0" smtClean="0"/>
-              <a:t>Finalize R</a:t>
-            </a:r>
-            <a:r>
-              <a:rPr lang="en-US" dirty="0" smtClean="0"/>
-              <a:t>-</a:t>
-            </a:r>
-            <a:r>
-              <a:rPr lang="en-US" dirty="0" smtClean="0"/>
-              <a:t>script</a:t>
+              <a:t>Finalize R-script</a:t>
             </a:r>
           </a:p>
           <a:p>
@@ -5902,7 +5928,7 @@
     </p:spTree>
     <p:extLst>
       <p:ext uri="{BB962C8B-B14F-4D97-AF65-F5344CB8AC3E}">
-        <p14:creationId xmlns:p14="http://schemas.microsoft.com/office/powerpoint/2010/main" val="1938490422"/>
+        <p14:creationId xmlns:p14="http://schemas.microsoft.com/office/powerpoint/2010/main" xmlns="" val="1938490422"/>
       </p:ext>
     </p:extLst>
   </p:cSld>
@@ -5912,7 +5938,7 @@
   <p:timing>
     <p:tnLst>
       <p:par>
-        <p:cTn xmlns:p14="http://schemas.microsoft.com/office/powerpoint/2010/main" id="1" dur="indefinite" restart="never" nodeType="tmRoot">
+        <p:cTn id="1" dur="indefinite" restart="never" nodeType="tmRoot">
           <p:childTnLst>
             <p:seq concurrent="1" nextAc="seek">
               <p:cTn id="2" dur="indefinite" nodeType="mainSeq">

</xml_diff>